<commit_message>
Updated SQL slide deck
</commit_message>
<xml_diff>
--- a/sql/sql_introductie.pptx
+++ b/sql/sql_introductie.pptx
@@ -6551,7 +6551,7 @@
           <a:p>
             <a:r>
               <a:rPr lang="en-US" dirty="0"/>
-              <a:t>AFM 2020</a:t>
+              <a:t>AFM 2022</a:t>
             </a:r>
           </a:p>
           <a:p>
@@ -7563,8 +7563,8 @@
         </p:nvSpPr>
         <p:spPr>
           <a:xfrm>
-            <a:off x="5280916" y="1825625"/>
-            <a:ext cx="6072883" cy="4351338"/>
+            <a:off x="5674938" y="1825625"/>
+            <a:ext cx="5678862" cy="4351338"/>
           </a:xfrm>
           <a:prstGeom prst="rect">
             <a:avLst/>
@@ -7843,6 +7843,42 @@
           </a:p>
         </p:txBody>
       </p:sp>
+      <p:cxnSp>
+        <p:nvCxnSpPr>
+          <p:cNvPr id="6" name="Straight Connector 5">
+            <a:extLst>
+              <a:ext uri="{FF2B5EF4-FFF2-40B4-BE49-F238E27FC236}">
+                <a16:creationId xmlns:a16="http://schemas.microsoft.com/office/drawing/2014/main" id="{2B2B0D11-81F6-B9C8-DBF6-57B1C542D8E7}"/>
+              </a:ext>
+            </a:extLst>
+          </p:cNvPr>
+          <p:cNvCxnSpPr/>
+          <p:nvPr/>
+        </p:nvCxnSpPr>
+        <p:spPr>
+          <a:xfrm>
+            <a:off x="5290979" y="1825625"/>
+            <a:ext cx="0" cy="4351338"/>
+          </a:xfrm>
+          <a:prstGeom prst="line">
+            <a:avLst/>
+          </a:prstGeom>
+        </p:spPr>
+        <p:style>
+          <a:lnRef idx="3">
+            <a:schemeClr val="dk1"/>
+          </a:lnRef>
+          <a:fillRef idx="0">
+            <a:schemeClr val="dk1"/>
+          </a:fillRef>
+          <a:effectRef idx="2">
+            <a:schemeClr val="dk1"/>
+          </a:effectRef>
+          <a:fontRef idx="minor">
+            <a:schemeClr val="tx1"/>
+          </a:fontRef>
+        </p:style>
+      </p:cxnSp>
     </p:spTree>
     <p:extLst>
       <p:ext uri="{BB962C8B-B14F-4D97-AF65-F5344CB8AC3E}">
@@ -8036,8 +8072,8 @@
         </p:nvSpPr>
         <p:spPr>
           <a:xfrm>
-            <a:off x="4874004" y="1825625"/>
-            <a:ext cx="6479796" cy="4351338"/>
+            <a:off x="5712644" y="1825625"/>
+            <a:ext cx="5641156" cy="4351338"/>
           </a:xfrm>
           <a:prstGeom prst="rect">
             <a:avLst/>
@@ -8255,7 +8291,7 @@
             <a:pPr lvl="1"/>
             <a:r>
               <a:rPr lang="nl-NL" sz="1800" dirty="0"/>
-              <a:t>Een selectiecriterium moet evalueren tot waar / onwaar:</a:t>
+              <a:t>Conditie moet waar of onwaar zijn</a:t>
             </a:r>
           </a:p>
           <a:p>
@@ -8265,7 +8301,7 @@
             <a:pPr lvl="1"/>
             <a:r>
               <a:rPr lang="nl-NL" sz="1800" dirty="0"/>
-              <a:t>Selectiecriteria kun je combineren met </a:t>
+              <a:t>Condities kun je combineren met </a:t>
             </a:r>
             <a:r>
               <a:rPr lang="nl-NL" sz="1800" dirty="0">
@@ -8297,9 +8333,19 @@
             <a:pPr lvl="1"/>
             <a:r>
               <a:rPr lang="nl-NL" sz="1800" dirty="0"/>
-              <a:t>Je kunt criteria groeperen met haken (…)</a:t>
-            </a:r>
-            <a:endParaRPr lang="nl-NL" dirty="0"/>
+              <a:t>Groeperen kan met haken </a:t>
+            </a:r>
+            <a:r>
+              <a:rPr lang="nl-NL" sz="1800" dirty="0">
+                <a:latin typeface="Courier New" panose="02070309020205020404" pitchFamily="49" charset="0"/>
+                <a:cs typeface="Courier New" panose="02070309020205020404" pitchFamily="49" charset="0"/>
+              </a:rPr>
+              <a:t>(…)</a:t>
+            </a:r>
+            <a:endParaRPr lang="nl-NL" dirty="0">
+              <a:latin typeface="Courier New" panose="02070309020205020404" pitchFamily="49" charset="0"/>
+              <a:cs typeface="Courier New" panose="02070309020205020404" pitchFamily="49" charset="0"/>
+            </a:endParaRPr>
           </a:p>
           <a:p>
             <a:pPr marL="0" indent="0">
@@ -8317,6 +8363,42 @@
           </a:p>
         </p:txBody>
       </p:sp>
+      <p:cxnSp>
+        <p:nvCxnSpPr>
+          <p:cNvPr id="4" name="Straight Connector 3">
+            <a:extLst>
+              <a:ext uri="{FF2B5EF4-FFF2-40B4-BE49-F238E27FC236}">
+                <a16:creationId xmlns:a16="http://schemas.microsoft.com/office/drawing/2014/main" id="{93CB7A14-C61C-728D-BCB7-4B033293604E}"/>
+              </a:ext>
+            </a:extLst>
+          </p:cNvPr>
+          <p:cNvCxnSpPr/>
+          <p:nvPr/>
+        </p:nvCxnSpPr>
+        <p:spPr>
+          <a:xfrm>
+            <a:off x="5290979" y="1825625"/>
+            <a:ext cx="0" cy="4351338"/>
+          </a:xfrm>
+          <a:prstGeom prst="line">
+            <a:avLst/>
+          </a:prstGeom>
+        </p:spPr>
+        <p:style>
+          <a:lnRef idx="3">
+            <a:schemeClr val="dk1"/>
+          </a:lnRef>
+          <a:fillRef idx="0">
+            <a:schemeClr val="dk1"/>
+          </a:fillRef>
+          <a:effectRef idx="2">
+            <a:schemeClr val="dk1"/>
+          </a:effectRef>
+          <a:fontRef idx="minor">
+            <a:schemeClr val="tx1"/>
+          </a:fontRef>
+        </p:style>
+      </p:cxnSp>
     </p:spTree>
     <p:extLst>
       <p:ext uri="{BB962C8B-B14F-4D97-AF65-F5344CB8AC3E}">
@@ -8372,7 +8454,7 @@
           <a:p>
             <a:r>
               <a:rPr lang="nl-NL" sz="3600" dirty="0"/>
-              <a:t>Selecteren criteria</a:t>
+              <a:t>Selectiecriteria</a:t>
             </a:r>
           </a:p>
         </p:txBody>
@@ -8557,8 +8639,8 @@
         </p:nvSpPr>
         <p:spPr>
           <a:xfrm>
-            <a:off x="6000108" y="1825625"/>
-            <a:ext cx="5353691" cy="4351338"/>
+            <a:off x="5712643" y="1825625"/>
+            <a:ext cx="5641157" cy="4351338"/>
           </a:xfrm>
           <a:prstGeom prst="rect">
             <a:avLst/>
@@ -8784,6 +8866,42 @@
           </a:p>
         </p:txBody>
       </p:sp>
+      <p:cxnSp>
+        <p:nvCxnSpPr>
+          <p:cNvPr id="4" name="Straight Connector 3">
+            <a:extLst>
+              <a:ext uri="{FF2B5EF4-FFF2-40B4-BE49-F238E27FC236}">
+                <a16:creationId xmlns:a16="http://schemas.microsoft.com/office/drawing/2014/main" id="{31B5B612-C695-CE5D-BA96-B8D59F690826}"/>
+              </a:ext>
+            </a:extLst>
+          </p:cNvPr>
+          <p:cNvCxnSpPr/>
+          <p:nvPr/>
+        </p:nvCxnSpPr>
+        <p:spPr>
+          <a:xfrm>
+            <a:off x="5290979" y="1825625"/>
+            <a:ext cx="0" cy="4351338"/>
+          </a:xfrm>
+          <a:prstGeom prst="line">
+            <a:avLst/>
+          </a:prstGeom>
+        </p:spPr>
+        <p:style>
+          <a:lnRef idx="3">
+            <a:schemeClr val="dk1"/>
+          </a:lnRef>
+          <a:fillRef idx="0">
+            <a:schemeClr val="dk1"/>
+          </a:fillRef>
+          <a:effectRef idx="2">
+            <a:schemeClr val="dk1"/>
+          </a:effectRef>
+          <a:fontRef idx="minor">
+            <a:schemeClr val="tx1"/>
+          </a:fontRef>
+        </p:style>
+      </p:cxnSp>
     </p:spTree>
     <p:extLst>
       <p:ext uri="{BB962C8B-B14F-4D97-AF65-F5344CB8AC3E}">
@@ -9021,8 +9139,8 @@
         </p:nvSpPr>
         <p:spPr>
           <a:xfrm>
-            <a:off x="6096000" y="1825625"/>
-            <a:ext cx="5257799" cy="4351338"/>
+            <a:off x="5691884" y="1825625"/>
+            <a:ext cx="5661916" cy="4351338"/>
           </a:xfrm>
           <a:prstGeom prst="rect">
             <a:avLst/>
@@ -9244,7 +9362,7 @@
             </a:r>
             <a:r>
               <a:rPr lang="nl-NL" sz="2000" dirty="0"/>
-              <a:t> voor oplopend sorteren (standaard) </a:t>
+              <a:t> 		oplopend (standaard) </a:t>
             </a:r>
           </a:p>
           <a:p>
@@ -9257,7 +9375,7 @@
             </a:r>
             <a:r>
               <a:rPr lang="nl-NL" sz="2000" dirty="0"/>
-              <a:t> voor aflopend te sorteren</a:t>
+              <a:t> 		aflopend</a:t>
             </a:r>
           </a:p>
           <a:p>
@@ -9272,7 +9390,7 @@
             </a:pPr>
             <a:r>
               <a:rPr lang="nl-NL" sz="2000" dirty="0"/>
-              <a:t>Sorteren i.c.m. </a:t>
+              <a:t>Sorteren met </a:t>
             </a:r>
             <a:r>
               <a:rPr lang="nl-NL" sz="2000" dirty="0">
@@ -9283,7 +9401,7 @@
             </a:r>
             <a:r>
               <a:rPr lang="nl-NL" sz="2000" dirty="0"/>
-              <a:t> is handige manier om top N te verkrijgen.</a:t>
+              <a:t> is handige manier om een top N te verkrijgen.</a:t>
             </a:r>
           </a:p>
           <a:p>
@@ -9314,6 +9432,42 @@
           </a:p>
         </p:txBody>
       </p:sp>
+      <p:cxnSp>
+        <p:nvCxnSpPr>
+          <p:cNvPr id="6" name="Straight Connector 5">
+            <a:extLst>
+              <a:ext uri="{FF2B5EF4-FFF2-40B4-BE49-F238E27FC236}">
+                <a16:creationId xmlns:a16="http://schemas.microsoft.com/office/drawing/2014/main" id="{E5B9DA5E-B79D-053F-0A8F-8B62972087A8}"/>
+              </a:ext>
+            </a:extLst>
+          </p:cNvPr>
+          <p:cNvCxnSpPr/>
+          <p:nvPr/>
+        </p:nvCxnSpPr>
+        <p:spPr>
+          <a:xfrm>
+            <a:off x="5290979" y="1825625"/>
+            <a:ext cx="0" cy="4351338"/>
+          </a:xfrm>
+          <a:prstGeom prst="line">
+            <a:avLst/>
+          </a:prstGeom>
+        </p:spPr>
+        <p:style>
+          <a:lnRef idx="3">
+            <a:schemeClr val="dk1"/>
+          </a:lnRef>
+          <a:fillRef idx="0">
+            <a:schemeClr val="dk1"/>
+          </a:fillRef>
+          <a:effectRef idx="2">
+            <a:schemeClr val="dk1"/>
+          </a:effectRef>
+          <a:fontRef idx="minor">
+            <a:schemeClr val="tx1"/>
+          </a:fontRef>
+        </p:style>
+      </p:cxnSp>
     </p:spTree>
     <p:extLst>
       <p:ext uri="{BB962C8B-B14F-4D97-AF65-F5344CB8AC3E}">
@@ -9463,7 +9617,7 @@
                 <a:latin typeface="Courier New" panose="02070309020205020404" pitchFamily="49" charset="0"/>
                 <a:cs typeface="Courier New" panose="02070309020205020404" pitchFamily="49" charset="0"/>
               </a:rPr>
-              <a:t>ROUND(Bedrag, 2) AS Bedrag</a:t>
+              <a:t>ROUND(Prijs, 2)</a:t>
             </a:r>
           </a:p>
           <a:p>
@@ -9484,15 +9638,27 @@
                 <a:latin typeface="Courier New" panose="02070309020205020404" pitchFamily="49" charset="0"/>
                 <a:cs typeface="Courier New" panose="02070309020205020404" pitchFamily="49" charset="0"/>
               </a:rPr>
-              <a:t>ABS(Error) AS </a:t>
+              <a:t>ABS(</a:t>
             </a:r>
             <a:r>
               <a:rPr lang="nl-NL" sz="2000" dirty="0" err="1">
                 <a:latin typeface="Courier New" panose="02070309020205020404" pitchFamily="49" charset="0"/>
                 <a:cs typeface="Courier New" panose="02070309020205020404" pitchFamily="49" charset="0"/>
               </a:rPr>
-              <a:t>AbsError</a:t>
-            </a:r>
+              <a:t>PrijsVerschil</a:t>
+            </a:r>
+            <a:r>
+              <a:rPr lang="nl-NL" sz="2000" dirty="0">
+                <a:latin typeface="Courier New" panose="02070309020205020404" pitchFamily="49" charset="0"/>
+                <a:cs typeface="Courier New" panose="02070309020205020404" pitchFamily="49" charset="0"/>
+              </a:rPr>
+              <a:t>)</a:t>
+            </a:r>
+          </a:p>
+          <a:p>
+            <a:pPr marL="0" indent="0">
+              <a:buNone/>
+            </a:pPr>
             <a:endParaRPr lang="nl-NL" sz="2000" dirty="0">
               <a:latin typeface="Courier New" panose="02070309020205020404" pitchFamily="49" charset="0"/>
               <a:cs typeface="Courier New" panose="02070309020205020404" pitchFamily="49" charset="0"/>
@@ -9502,21 +9668,12 @@
             <a:pPr marL="0" indent="0">
               <a:buNone/>
             </a:pPr>
-            <a:endParaRPr lang="nl-NL" sz="2000" dirty="0">
-              <a:latin typeface="Courier New" panose="02070309020205020404" pitchFamily="49" charset="0"/>
-              <a:cs typeface="Courier New" panose="02070309020205020404" pitchFamily="49" charset="0"/>
-            </a:endParaRPr>
-          </a:p>
-          <a:p>
-            <a:pPr marL="0" indent="0">
-              <a:buNone/>
-            </a:pPr>
             <a:r>
               <a:rPr lang="nl-NL" sz="2000" dirty="0">
                 <a:latin typeface="Courier New" panose="02070309020205020404" pitchFamily="49" charset="0"/>
                 <a:cs typeface="Courier New" panose="02070309020205020404" pitchFamily="49" charset="0"/>
               </a:rPr>
-              <a:t>COALESCE(Bedrag, 0)</a:t>
+              <a:t>COALESCE(Prijs, 0)</a:t>
             </a:r>
           </a:p>
           <a:p>
@@ -9567,8 +9724,8 @@
         </p:nvSpPr>
         <p:spPr>
           <a:xfrm>
-            <a:off x="6274084" y="1825625"/>
-            <a:ext cx="5079715" cy="4351338"/>
+            <a:off x="6881567" y="1825625"/>
+            <a:ext cx="4472232" cy="4351338"/>
           </a:xfrm>
           <a:prstGeom prst="rect">
             <a:avLst/>
@@ -9789,6 +9946,42 @@
           </a:p>
         </p:txBody>
       </p:sp>
+      <p:cxnSp>
+        <p:nvCxnSpPr>
+          <p:cNvPr id="6" name="Straight Connector 5">
+            <a:extLst>
+              <a:ext uri="{FF2B5EF4-FFF2-40B4-BE49-F238E27FC236}">
+                <a16:creationId xmlns:a16="http://schemas.microsoft.com/office/drawing/2014/main" id="{C97E7424-A332-BEE8-F6B5-27F6C0C3F648}"/>
+              </a:ext>
+            </a:extLst>
+          </p:cNvPr>
+          <p:cNvCxnSpPr/>
+          <p:nvPr/>
+        </p:nvCxnSpPr>
+        <p:spPr>
+          <a:xfrm>
+            <a:off x="6601305" y="1825625"/>
+            <a:ext cx="0" cy="4351338"/>
+          </a:xfrm>
+          <a:prstGeom prst="line">
+            <a:avLst/>
+          </a:prstGeom>
+        </p:spPr>
+        <p:style>
+          <a:lnRef idx="3">
+            <a:schemeClr val="dk1"/>
+          </a:lnRef>
+          <a:fillRef idx="0">
+            <a:schemeClr val="dk1"/>
+          </a:fillRef>
+          <a:effectRef idx="2">
+            <a:schemeClr val="dk1"/>
+          </a:effectRef>
+          <a:fontRef idx="minor">
+            <a:schemeClr val="tx1"/>
+          </a:fontRef>
+        </p:style>
+      </p:cxnSp>
     </p:spTree>
     <p:extLst>
       <p:ext uri="{BB962C8B-B14F-4D97-AF65-F5344CB8AC3E}">
@@ -9991,8 +10184,8 @@
         </p:nvSpPr>
         <p:spPr>
           <a:xfrm>
-            <a:off x="6096000" y="1825625"/>
-            <a:ext cx="5257799" cy="4351338"/>
+            <a:off x="6919280" y="1825625"/>
+            <a:ext cx="4434520" cy="4351338"/>
           </a:xfrm>
           <a:prstGeom prst="rect">
             <a:avLst/>
@@ -10195,6 +10388,42 @@
           </a:p>
         </p:txBody>
       </p:sp>
+      <p:cxnSp>
+        <p:nvCxnSpPr>
+          <p:cNvPr id="4" name="Straight Connector 3">
+            <a:extLst>
+              <a:ext uri="{FF2B5EF4-FFF2-40B4-BE49-F238E27FC236}">
+                <a16:creationId xmlns:a16="http://schemas.microsoft.com/office/drawing/2014/main" id="{71074AB4-5410-D2E5-637E-402FA9317E9C}"/>
+              </a:ext>
+            </a:extLst>
+          </p:cNvPr>
+          <p:cNvCxnSpPr/>
+          <p:nvPr/>
+        </p:nvCxnSpPr>
+        <p:spPr>
+          <a:xfrm>
+            <a:off x="6601305" y="1825625"/>
+            <a:ext cx="0" cy="4351338"/>
+          </a:xfrm>
+          <a:prstGeom prst="line">
+            <a:avLst/>
+          </a:prstGeom>
+        </p:spPr>
+        <p:style>
+          <a:lnRef idx="3">
+            <a:schemeClr val="dk1"/>
+          </a:lnRef>
+          <a:fillRef idx="0">
+            <a:schemeClr val="dk1"/>
+          </a:fillRef>
+          <a:effectRef idx="2">
+            <a:schemeClr val="dk1"/>
+          </a:effectRef>
+          <a:fontRef idx="minor">
+            <a:schemeClr val="tx1"/>
+          </a:fontRef>
+        </p:style>
+      </p:cxnSp>
     </p:spTree>
     <p:extLst>
       <p:ext uri="{BB962C8B-B14F-4D97-AF65-F5344CB8AC3E}">
@@ -10291,7 +10520,31 @@
                 <a:latin typeface="Courier New" panose="02070309020205020404" pitchFamily="49" charset="0"/>
                 <a:cs typeface="Courier New" panose="02070309020205020404" pitchFamily="49" charset="0"/>
               </a:rPr>
-              <a:t>CURRENT_DATE / CURRENT_TIME / CURRENT_TIMESTAMP</a:t>
+              <a:t>CURRENT_DATE </a:t>
+            </a:r>
+          </a:p>
+          <a:p>
+            <a:pPr marL="0" indent="0">
+              <a:buNone/>
+            </a:pPr>
+            <a:r>
+              <a:rPr lang="nl-NL" sz="1800" dirty="0">
+                <a:latin typeface="Courier New" panose="02070309020205020404" pitchFamily="49" charset="0"/>
+                <a:cs typeface="Courier New" panose="02070309020205020404" pitchFamily="49" charset="0"/>
+              </a:rPr>
+              <a:t>CURRENT_TIME</a:t>
+            </a:r>
+          </a:p>
+          <a:p>
+            <a:pPr marL="0" indent="0">
+              <a:buNone/>
+            </a:pPr>
+            <a:r>
+              <a:rPr lang="nl-NL" sz="1800" dirty="0">
+                <a:latin typeface="Courier New" panose="02070309020205020404" pitchFamily="49" charset="0"/>
+                <a:cs typeface="Courier New" panose="02070309020205020404" pitchFamily="49" charset="0"/>
+              </a:rPr>
+              <a:t>CURRENT_TIMESTAMP</a:t>
             </a:r>
           </a:p>
           <a:p>
@@ -10333,7 +10586,21 @@
                 <a:latin typeface="Courier New" panose="02070309020205020404" pitchFamily="49" charset="0"/>
                 <a:cs typeface="Courier New" panose="02070309020205020404" pitchFamily="49" charset="0"/>
               </a:rPr>
-              <a:t>DATE(“2020-12-01”, “3 MONTH”)</a:t>
+              <a:t>DATE(</a:t>
+            </a:r>
+            <a:r>
+              <a:rPr lang="nl-NL" sz="1800" dirty="0" err="1">
+                <a:latin typeface="Courier New" panose="02070309020205020404" pitchFamily="49" charset="0"/>
+                <a:cs typeface="Courier New" panose="02070309020205020404" pitchFamily="49" charset="0"/>
+              </a:rPr>
+              <a:t>EindDatum</a:t>
+            </a:r>
+            <a:r>
+              <a:rPr lang="nl-NL" sz="1800" dirty="0">
+                <a:latin typeface="Courier New" panose="02070309020205020404" pitchFamily="49" charset="0"/>
+                <a:cs typeface="Courier New" panose="02070309020205020404" pitchFamily="49" charset="0"/>
+              </a:rPr>
+              <a:t>, “-1 MONTH”)</a:t>
             </a:r>
           </a:p>
           <a:p>
@@ -10375,7 +10642,7 @@
                 <a:latin typeface="Courier New" panose="02070309020205020404" pitchFamily="49" charset="0"/>
                 <a:cs typeface="Courier New" panose="02070309020205020404" pitchFamily="49" charset="0"/>
               </a:rPr>
-              <a:t>STRFTIME(&lt;format&gt;, &lt;datum&gt;)</a:t>
+              <a:t>STRFTIME(“%d-%m-%Y”, &lt;datum&gt;)</a:t>
             </a:r>
           </a:p>
           <a:p>
@@ -10405,8 +10672,8 @@
         </p:nvSpPr>
         <p:spPr>
           <a:xfrm>
-            <a:off x="6818615" y="1825625"/>
-            <a:ext cx="4535184" cy="4351338"/>
+            <a:off x="6985261" y="1825625"/>
+            <a:ext cx="4368537" cy="4351338"/>
           </a:xfrm>
           <a:prstGeom prst="rect">
             <a:avLst/>
@@ -10414,7 +10681,7 @@
         </p:spPr>
         <p:txBody>
           <a:bodyPr vert="horz" lIns="91440" tIns="45720" rIns="91440" bIns="45720" rtlCol="0">
-            <a:normAutofit lnSpcReduction="10000"/>
+            <a:noAutofit/>
           </a:bodyPr>
           <a:lstStyle>
             <a:lvl1pPr marL="228600" indent="-228600" algn="l" defTabSz="914400" rtl="0" eaLnBrk="1" latinLnBrk="0" hangingPunct="1">
@@ -10583,28 +10850,52 @@
           <a:p>
             <a:r>
               <a:rPr lang="nl-NL" sz="1800" dirty="0"/>
-              <a:t>Huidige datum / tijd / datum en tijd</a:t>
-            </a:r>
-          </a:p>
-          <a:p>
+              <a:t>Huidige datum</a:t>
+            </a:r>
+          </a:p>
+          <a:p>
+            <a:r>
+              <a:rPr lang="nl-NL" sz="1800" dirty="0"/>
+              <a:t>Huidige tijd</a:t>
+            </a:r>
+          </a:p>
+          <a:p>
+            <a:r>
+              <a:rPr lang="nl-NL" sz="1800" dirty="0"/>
+              <a:t>Huidige datum en tijd</a:t>
+            </a:r>
+          </a:p>
+          <a:p>
+            <a:pPr marL="0" indent="0">
+              <a:buNone/>
+            </a:pPr>
             <a:endParaRPr lang="nl-NL" sz="1800" dirty="0"/>
           </a:p>
           <a:p>
+            <a:r>
+              <a:rPr lang="nl-NL" sz="1800" dirty="0"/>
+              <a:t>Specifieke datum.</a:t>
+            </a:r>
+          </a:p>
+          <a:p>
             <a:endParaRPr lang="nl-NL" sz="1800" dirty="0"/>
           </a:p>
           <a:p>
             <a:r>
               <a:rPr lang="nl-NL" sz="1800" dirty="0"/>
-              <a:t>Maak datum aan.</a:t>
-            </a:r>
-          </a:p>
-          <a:p>
+              <a:t>Datum met een tijdsverschil.</a:t>
+            </a:r>
+          </a:p>
+          <a:p>
+            <a:pPr marL="0" indent="0">
+              <a:buNone/>
+            </a:pPr>
             <a:endParaRPr lang="nl-NL" sz="1800" dirty="0"/>
           </a:p>
           <a:p>
             <a:r>
               <a:rPr lang="nl-NL" sz="1800" dirty="0"/>
-              <a:t>Datum met tijdsverschil: +3 maanden.</a:t>
+              <a:t>Verschil tussen 2 data in dagen.</a:t>
             </a:r>
           </a:p>
           <a:p>
@@ -10613,44 +10904,8 @@
           <a:p>
             <a:r>
               <a:rPr lang="nl-NL" sz="1800" dirty="0"/>
-              <a:t>Verschil tussen 2 datums in dagen.</a:t>
-            </a:r>
-          </a:p>
-          <a:p>
-            <a:endParaRPr lang="nl-NL" sz="1800" dirty="0"/>
-          </a:p>
-          <a:p>
-            <a:r>
-              <a:rPr lang="nl-NL" sz="1800" dirty="0"/>
-              <a:t>Verander weergave; keuze uit onderdelen:</a:t>
-            </a:r>
-          </a:p>
-          <a:p>
-            <a:pPr lvl="1"/>
-            <a:r>
-              <a:rPr lang="nl-NL" sz="1400" dirty="0"/>
-              <a:t>%Y		jaar	%H	uur</a:t>
-            </a:r>
-          </a:p>
-          <a:p>
-            <a:pPr lvl="1"/>
-            <a:r>
-              <a:rPr lang="nl-NL" sz="1400" dirty="0"/>
-              <a:t>%m	maand	%M 	minuut</a:t>
-            </a:r>
-          </a:p>
-          <a:p>
-            <a:pPr lvl="1"/>
-            <a:r>
-              <a:rPr lang="nl-NL" sz="1400" dirty="0"/>
-              <a:t>%d 	dag	%S	seconde</a:t>
-            </a:r>
-          </a:p>
-          <a:p>
-            <a:pPr marL="457200" lvl="1" indent="0">
-              <a:buNone/>
-            </a:pPr>
-            <a:endParaRPr lang="nl-NL" sz="1400" dirty="0"/>
+              <a:t>Datum opgemaakt als tekst.</a:t>
+            </a:r>
           </a:p>
           <a:p>
             <a:pPr marL="0" indent="0">
@@ -10672,6 +10927,42 @@
           </a:p>
         </p:txBody>
       </p:sp>
+      <p:cxnSp>
+        <p:nvCxnSpPr>
+          <p:cNvPr id="4" name="Straight Connector 3">
+            <a:extLst>
+              <a:ext uri="{FF2B5EF4-FFF2-40B4-BE49-F238E27FC236}">
+                <a16:creationId xmlns:a16="http://schemas.microsoft.com/office/drawing/2014/main" id="{5AC11015-861E-CD95-6F4D-7119ADD4252B}"/>
+              </a:ext>
+            </a:extLst>
+          </p:cNvPr>
+          <p:cNvCxnSpPr/>
+          <p:nvPr/>
+        </p:nvCxnSpPr>
+        <p:spPr>
+          <a:xfrm>
+            <a:off x="6601305" y="1825625"/>
+            <a:ext cx="0" cy="4351338"/>
+          </a:xfrm>
+          <a:prstGeom prst="line">
+            <a:avLst/>
+          </a:prstGeom>
+        </p:spPr>
+        <p:style>
+          <a:lnRef idx="3">
+            <a:schemeClr val="dk1"/>
+          </a:lnRef>
+          <a:fillRef idx="0">
+            <a:schemeClr val="dk1"/>
+          </a:fillRef>
+          <a:effectRef idx="2">
+            <a:schemeClr val="dk1"/>
+          </a:effectRef>
+          <a:fontRef idx="minor">
+            <a:schemeClr val="tx1"/>
+          </a:fontRef>
+        </p:style>
+      </p:cxnSp>
     </p:spTree>
     <p:extLst>
       <p:ext uri="{BB962C8B-B14F-4D97-AF65-F5344CB8AC3E}">
@@ -11080,8 +11371,8 @@
         </p:nvSpPr>
         <p:spPr>
           <a:xfrm>
-            <a:off x="7366570" y="1825625"/>
-            <a:ext cx="3987229" cy="4351338"/>
+            <a:off x="6966409" y="1825625"/>
+            <a:ext cx="4883078" cy="4351338"/>
           </a:xfrm>
           <a:prstGeom prst="rect">
             <a:avLst/>
@@ -11262,7 +11553,18 @@
             </a:pPr>
             <a:r>
               <a:rPr lang="nl-NL" sz="2000" dirty="0"/>
-              <a:t>Met het CASE statement maak je een logische beslisboom.</a:t>
+              <a:t>Met het </a:t>
+            </a:r>
+            <a:r>
+              <a:rPr lang="nl-NL" sz="2000" dirty="0">
+                <a:latin typeface="Courier New" panose="02070309020205020404" pitchFamily="49" charset="0"/>
+                <a:cs typeface="Courier New" panose="02070309020205020404" pitchFamily="49" charset="0"/>
+              </a:rPr>
+              <a:t>CASE</a:t>
+            </a:r>
+            <a:r>
+              <a:rPr lang="nl-NL" sz="2000" dirty="0"/>
+              <a:t> statement maak je een logische beslisboom.</a:t>
             </a:r>
           </a:p>
           <a:p>
@@ -11288,7 +11590,10 @@
               <a:buNone/>
             </a:pPr>
             <a:r>
-              <a:rPr lang="nl-NL" sz="2000" dirty="0"/>
+              <a:rPr lang="nl-NL" sz="2000" dirty="0">
+                <a:latin typeface="Courier New" panose="02070309020205020404" pitchFamily="49" charset="0"/>
+                <a:cs typeface="Courier New" panose="02070309020205020404" pitchFamily="49" charset="0"/>
+              </a:rPr>
               <a:t>WHEN &lt;conditie&gt; THEN &lt;waarde&gt;</a:t>
             </a:r>
           </a:p>
@@ -11306,7 +11611,18 @@
             </a:pPr>
             <a:r>
               <a:rPr lang="nl-NL" sz="2000" dirty="0"/>
-              <a:t>De ELSE categorie is er om alle overgebleven gevallen af te vangen.</a:t>
+              <a:t>De </a:t>
+            </a:r>
+            <a:r>
+              <a:rPr lang="nl-NL" sz="2000" dirty="0">
+                <a:latin typeface="Courier New" panose="02070309020205020404" pitchFamily="49" charset="0"/>
+                <a:cs typeface="Courier New" panose="02070309020205020404" pitchFamily="49" charset="0"/>
+              </a:rPr>
+              <a:t>ELSE </a:t>
+            </a:r>
+            <a:r>
+              <a:rPr lang="nl-NL" sz="2000" dirty="0"/>
+              <a:t>categorie is er om alle overgebleven gevallen af te vangen.</a:t>
             </a:r>
           </a:p>
           <a:p>
@@ -11328,6 +11644,42 @@
           </a:p>
         </p:txBody>
       </p:sp>
+      <p:cxnSp>
+        <p:nvCxnSpPr>
+          <p:cNvPr id="6" name="Straight Connector 5">
+            <a:extLst>
+              <a:ext uri="{FF2B5EF4-FFF2-40B4-BE49-F238E27FC236}">
+                <a16:creationId xmlns:a16="http://schemas.microsoft.com/office/drawing/2014/main" id="{8F52A9C5-E36C-675F-F77B-7067B103E10F}"/>
+              </a:ext>
+            </a:extLst>
+          </p:cNvPr>
+          <p:cNvCxnSpPr/>
+          <p:nvPr/>
+        </p:nvCxnSpPr>
+        <p:spPr>
+          <a:xfrm>
+            <a:off x="6601305" y="1825625"/>
+            <a:ext cx="0" cy="4351338"/>
+          </a:xfrm>
+          <a:prstGeom prst="line">
+            <a:avLst/>
+          </a:prstGeom>
+        </p:spPr>
+        <p:style>
+          <a:lnRef idx="3">
+            <a:schemeClr val="dk1"/>
+          </a:lnRef>
+          <a:fillRef idx="0">
+            <a:schemeClr val="dk1"/>
+          </a:fillRef>
+          <a:effectRef idx="2">
+            <a:schemeClr val="dk1"/>
+          </a:effectRef>
+          <a:fontRef idx="minor">
+            <a:schemeClr val="tx1"/>
+          </a:fontRef>
+        </p:style>
+      </p:cxnSp>
     </p:spTree>
     <p:extLst>
       <p:ext uri="{BB962C8B-B14F-4D97-AF65-F5344CB8AC3E}">
@@ -11360,6 +11712,233 @@
       </p:grpSpPr>
       <p:sp>
         <p:nvSpPr>
+          <p:cNvPr id="3" name="Content Placeholder 2">
+            <a:extLst>
+              <a:ext uri="{FF2B5EF4-FFF2-40B4-BE49-F238E27FC236}">
+                <a16:creationId xmlns:a16="http://schemas.microsoft.com/office/drawing/2014/main" id="{7844B503-C44F-453E-9465-D42E4557DE0C}"/>
+              </a:ext>
+            </a:extLst>
+          </p:cNvPr>
+          <p:cNvSpPr>
+            <a:spLocks noGrp="1"/>
+          </p:cNvSpPr>
+          <p:nvPr>
+            <p:ph idx="1"/>
+          </p:nvPr>
+        </p:nvSpPr>
+        <p:spPr>
+          <a:xfrm>
+            <a:off x="838201" y="1825625"/>
+            <a:ext cx="5593421" cy="4351338"/>
+          </a:xfrm>
+        </p:spPr>
+        <p:txBody>
+          <a:bodyPr>
+            <a:normAutofit/>
+          </a:bodyPr>
+          <a:lstStyle/>
+          <a:p>
+            <a:pPr marL="0" indent="0">
+              <a:buNone/>
+            </a:pPr>
+            <a:r>
+              <a:rPr lang="nl-NL" sz="2000" dirty="0">
+                <a:latin typeface="Courier New" panose="02070309020205020404" pitchFamily="49" charset="0"/>
+                <a:cs typeface="Courier New" panose="02070309020205020404" pitchFamily="49" charset="0"/>
+              </a:rPr>
+              <a:t>SELECT</a:t>
+            </a:r>
+          </a:p>
+          <a:p>
+            <a:pPr marL="0" indent="0">
+              <a:buNone/>
+            </a:pPr>
+            <a:r>
+              <a:rPr lang="nl-NL" sz="2000" dirty="0">
+                <a:latin typeface="Courier New" panose="02070309020205020404" pitchFamily="49" charset="0"/>
+                <a:cs typeface="Courier New" panose="02070309020205020404" pitchFamily="49" charset="0"/>
+              </a:rPr>
+              <a:t>  COUNT(*)  AS </a:t>
+            </a:r>
+            <a:r>
+              <a:rPr lang="nl-NL" sz="2000" dirty="0" err="1">
+                <a:latin typeface="Courier New" panose="02070309020205020404" pitchFamily="49" charset="0"/>
+                <a:cs typeface="Courier New" panose="02070309020205020404" pitchFamily="49" charset="0"/>
+              </a:rPr>
+              <a:t>AantalTransacties</a:t>
+            </a:r>
+            <a:endParaRPr lang="nl-NL" sz="2000" dirty="0">
+              <a:latin typeface="Courier New" panose="02070309020205020404" pitchFamily="49" charset="0"/>
+              <a:cs typeface="Courier New" panose="02070309020205020404" pitchFamily="49" charset="0"/>
+            </a:endParaRPr>
+          </a:p>
+          <a:p>
+            <a:pPr marL="0" indent="0">
+              <a:buNone/>
+            </a:pPr>
+            <a:r>
+              <a:rPr lang="nl-NL" sz="2000" dirty="0">
+                <a:latin typeface="Courier New" panose="02070309020205020404" pitchFamily="49" charset="0"/>
+                <a:cs typeface="Courier New" panose="02070309020205020404" pitchFamily="49" charset="0"/>
+              </a:rPr>
+              <a:t>FROM (</a:t>
+            </a:r>
+          </a:p>
+          <a:p>
+            <a:pPr marL="0" indent="0">
+              <a:buNone/>
+            </a:pPr>
+            <a:r>
+              <a:rPr lang="nl-NL" sz="2000" dirty="0">
+                <a:latin typeface="Courier New" panose="02070309020205020404" pitchFamily="49" charset="0"/>
+                <a:cs typeface="Courier New" panose="02070309020205020404" pitchFamily="49" charset="0"/>
+              </a:rPr>
+              <a:t>  SELECT</a:t>
+            </a:r>
+          </a:p>
+          <a:p>
+            <a:pPr marL="0" indent="0">
+              <a:buNone/>
+            </a:pPr>
+            <a:r>
+              <a:rPr lang="nl-NL" sz="2000" dirty="0">
+                <a:latin typeface="Courier New" panose="02070309020205020404" pitchFamily="49" charset="0"/>
+                <a:cs typeface="Courier New" panose="02070309020205020404" pitchFamily="49" charset="0"/>
+              </a:rPr>
+              <a:t>    </a:t>
+            </a:r>
+            <a:r>
+              <a:rPr lang="nl-NL" sz="2000" dirty="0" err="1">
+                <a:latin typeface="Courier New" panose="02070309020205020404" pitchFamily="49" charset="0"/>
+                <a:cs typeface="Courier New" panose="02070309020205020404" pitchFamily="49" charset="0"/>
+              </a:rPr>
+              <a:t>TransactieId</a:t>
+            </a:r>
+            <a:r>
+              <a:rPr lang="nl-NL" sz="2000" dirty="0">
+                <a:latin typeface="Courier New" panose="02070309020205020404" pitchFamily="49" charset="0"/>
+                <a:cs typeface="Courier New" panose="02070309020205020404" pitchFamily="49" charset="0"/>
+              </a:rPr>
+              <a:t>,</a:t>
+            </a:r>
+          </a:p>
+          <a:p>
+            <a:pPr marL="0" indent="0">
+              <a:buNone/>
+            </a:pPr>
+            <a:r>
+              <a:rPr lang="nl-NL" sz="2000" dirty="0">
+                <a:latin typeface="Courier New" panose="02070309020205020404" pitchFamily="49" charset="0"/>
+                <a:cs typeface="Courier New" panose="02070309020205020404" pitchFamily="49" charset="0"/>
+              </a:rPr>
+              <a:t>    </a:t>
+            </a:r>
+            <a:r>
+              <a:rPr lang="nl-NL" sz="2000" dirty="0" err="1">
+                <a:latin typeface="Courier New" panose="02070309020205020404" pitchFamily="49" charset="0"/>
+                <a:cs typeface="Courier New" panose="02070309020205020404" pitchFamily="49" charset="0"/>
+              </a:rPr>
+              <a:t>PrijsEx</a:t>
+            </a:r>
+            <a:r>
+              <a:rPr lang="nl-NL" sz="2000" dirty="0">
+                <a:latin typeface="Courier New" panose="02070309020205020404" pitchFamily="49" charset="0"/>
+                <a:cs typeface="Courier New" panose="02070309020205020404" pitchFamily="49" charset="0"/>
+              </a:rPr>
+              <a:t> + </a:t>
+            </a:r>
+            <a:r>
+              <a:rPr lang="nl-NL" sz="2000" dirty="0" err="1">
+                <a:latin typeface="Courier New" panose="02070309020205020404" pitchFamily="49" charset="0"/>
+                <a:cs typeface="Courier New" panose="02070309020205020404" pitchFamily="49" charset="0"/>
+              </a:rPr>
+              <a:t>BedragBTW</a:t>
+            </a:r>
+            <a:r>
+              <a:rPr lang="nl-NL" sz="2000" dirty="0">
+                <a:latin typeface="Courier New" panose="02070309020205020404" pitchFamily="49" charset="0"/>
+                <a:cs typeface="Courier New" panose="02070309020205020404" pitchFamily="49" charset="0"/>
+              </a:rPr>
+              <a:t> AS </a:t>
+            </a:r>
+            <a:r>
+              <a:rPr lang="nl-NL" sz="2000" dirty="0" err="1">
+                <a:latin typeface="Courier New" panose="02070309020205020404" pitchFamily="49" charset="0"/>
+                <a:cs typeface="Courier New" panose="02070309020205020404" pitchFamily="49" charset="0"/>
+              </a:rPr>
+              <a:t>PrijsInc</a:t>
+            </a:r>
+            <a:endParaRPr lang="nl-NL" sz="2000" dirty="0">
+              <a:latin typeface="Courier New" panose="02070309020205020404" pitchFamily="49" charset="0"/>
+              <a:cs typeface="Courier New" panose="02070309020205020404" pitchFamily="49" charset="0"/>
+            </a:endParaRPr>
+          </a:p>
+          <a:p>
+            <a:pPr marL="0" indent="0">
+              <a:buNone/>
+            </a:pPr>
+            <a:r>
+              <a:rPr lang="nl-NL" sz="2000" dirty="0">
+                <a:latin typeface="Courier New" panose="02070309020205020404" pitchFamily="49" charset="0"/>
+                <a:cs typeface="Courier New" panose="02070309020205020404" pitchFamily="49" charset="0"/>
+              </a:rPr>
+              <a:t>  FROM Transacties</a:t>
+            </a:r>
+          </a:p>
+          <a:p>
+            <a:pPr marL="0" indent="0">
+              <a:buNone/>
+            </a:pPr>
+            <a:r>
+              <a:rPr lang="nl-NL" sz="2000" dirty="0">
+                <a:latin typeface="Courier New" panose="02070309020205020404" pitchFamily="49" charset="0"/>
+                <a:cs typeface="Courier New" panose="02070309020205020404" pitchFamily="49" charset="0"/>
+              </a:rPr>
+              <a:t>)</a:t>
+            </a:r>
+          </a:p>
+          <a:p>
+            <a:pPr marL="0" indent="0">
+              <a:buNone/>
+            </a:pPr>
+            <a:r>
+              <a:rPr lang="nl-NL" sz="2000" dirty="0">
+                <a:latin typeface="Courier New" panose="02070309020205020404" pitchFamily="49" charset="0"/>
+                <a:cs typeface="Courier New" panose="02070309020205020404" pitchFamily="49" charset="0"/>
+              </a:rPr>
+              <a:t>WHERE </a:t>
+            </a:r>
+            <a:r>
+              <a:rPr lang="nl-NL" sz="2000" dirty="0" err="1">
+                <a:latin typeface="Courier New" panose="02070309020205020404" pitchFamily="49" charset="0"/>
+                <a:cs typeface="Courier New" panose="02070309020205020404" pitchFamily="49" charset="0"/>
+              </a:rPr>
+              <a:t>PrijsInc</a:t>
+            </a:r>
+            <a:r>
+              <a:rPr lang="nl-NL" sz="2000" dirty="0">
+                <a:latin typeface="Courier New" panose="02070309020205020404" pitchFamily="49" charset="0"/>
+                <a:cs typeface="Courier New" panose="02070309020205020404" pitchFamily="49" charset="0"/>
+              </a:rPr>
+              <a:t> &lt;= 10</a:t>
+            </a:r>
+          </a:p>
+          <a:p>
+            <a:pPr marL="0" indent="0">
+              <a:buNone/>
+            </a:pPr>
+            <a:r>
+              <a:rPr lang="nl-NL" sz="2000" dirty="0">
+                <a:latin typeface="Courier New" panose="02070309020205020404" pitchFamily="49" charset="0"/>
+                <a:cs typeface="Courier New" panose="02070309020205020404" pitchFamily="49" charset="0"/>
+              </a:rPr>
+              <a:t>;</a:t>
+            </a:r>
+          </a:p>
+        </p:txBody>
+      </p:sp>
+      <p:sp>
+        <p:nvSpPr>
           <p:cNvPr id="4" name="Rectangle 3">
             <a:extLst>
               <a:ext uri="{FF2B5EF4-FFF2-40B4-BE49-F238E27FC236}">
@@ -11372,8 +11951,8 @@
         </p:nvSpPr>
         <p:spPr>
           <a:xfrm>
-            <a:off x="923827" y="2969443"/>
-            <a:ext cx="5740924" cy="1696825"/>
+            <a:off x="1150070" y="2969443"/>
+            <a:ext cx="5281552" cy="1696825"/>
           </a:xfrm>
           <a:prstGeom prst="rect">
             <a:avLst/>
@@ -11445,233 +12024,6 @@
       </p:sp>
       <p:sp>
         <p:nvSpPr>
-          <p:cNvPr id="3" name="Content Placeholder 2">
-            <a:extLst>
-              <a:ext uri="{FF2B5EF4-FFF2-40B4-BE49-F238E27FC236}">
-                <a16:creationId xmlns:a16="http://schemas.microsoft.com/office/drawing/2014/main" id="{7844B503-C44F-453E-9465-D42E4557DE0C}"/>
-              </a:ext>
-            </a:extLst>
-          </p:cNvPr>
-          <p:cNvSpPr>
-            <a:spLocks noGrp="1"/>
-          </p:cNvSpPr>
-          <p:nvPr>
-            <p:ph idx="1"/>
-          </p:nvPr>
-        </p:nvSpPr>
-        <p:spPr>
-          <a:xfrm>
-            <a:off x="838201" y="1825625"/>
-            <a:ext cx="5593421" cy="4351338"/>
-          </a:xfrm>
-        </p:spPr>
-        <p:txBody>
-          <a:bodyPr>
-            <a:normAutofit/>
-          </a:bodyPr>
-          <a:lstStyle/>
-          <a:p>
-            <a:pPr marL="0" indent="0">
-              <a:buNone/>
-            </a:pPr>
-            <a:r>
-              <a:rPr lang="nl-NL" sz="2000" dirty="0">
-                <a:latin typeface="Courier New" panose="02070309020205020404" pitchFamily="49" charset="0"/>
-                <a:cs typeface="Courier New" panose="02070309020205020404" pitchFamily="49" charset="0"/>
-              </a:rPr>
-              <a:t>SELECT</a:t>
-            </a:r>
-          </a:p>
-          <a:p>
-            <a:pPr marL="0" indent="0">
-              <a:buNone/>
-            </a:pPr>
-            <a:r>
-              <a:rPr lang="nl-NL" sz="2000" dirty="0">
-                <a:latin typeface="Courier New" panose="02070309020205020404" pitchFamily="49" charset="0"/>
-                <a:cs typeface="Courier New" panose="02070309020205020404" pitchFamily="49" charset="0"/>
-              </a:rPr>
-              <a:t>  COUNT(*)  AS </a:t>
-            </a:r>
-            <a:r>
-              <a:rPr lang="nl-NL" sz="2000" dirty="0" err="1">
-                <a:latin typeface="Courier New" panose="02070309020205020404" pitchFamily="49" charset="0"/>
-                <a:cs typeface="Courier New" panose="02070309020205020404" pitchFamily="49" charset="0"/>
-              </a:rPr>
-              <a:t>AantalTransacties</a:t>
-            </a:r>
-            <a:endParaRPr lang="nl-NL" sz="2000" dirty="0">
-              <a:latin typeface="Courier New" panose="02070309020205020404" pitchFamily="49" charset="0"/>
-              <a:cs typeface="Courier New" panose="02070309020205020404" pitchFamily="49" charset="0"/>
-            </a:endParaRPr>
-          </a:p>
-          <a:p>
-            <a:pPr marL="0" indent="0">
-              <a:buNone/>
-            </a:pPr>
-            <a:r>
-              <a:rPr lang="nl-NL" sz="2000" dirty="0">
-                <a:latin typeface="Courier New" panose="02070309020205020404" pitchFamily="49" charset="0"/>
-                <a:cs typeface="Courier New" panose="02070309020205020404" pitchFamily="49" charset="0"/>
-              </a:rPr>
-              <a:t>FROM (</a:t>
-            </a:r>
-          </a:p>
-          <a:p>
-            <a:pPr marL="0" indent="0">
-              <a:buNone/>
-            </a:pPr>
-            <a:r>
-              <a:rPr lang="nl-NL" sz="2000" dirty="0">
-                <a:latin typeface="Courier New" panose="02070309020205020404" pitchFamily="49" charset="0"/>
-                <a:cs typeface="Courier New" panose="02070309020205020404" pitchFamily="49" charset="0"/>
-              </a:rPr>
-              <a:t>  SELECT</a:t>
-            </a:r>
-          </a:p>
-          <a:p>
-            <a:pPr marL="0" indent="0">
-              <a:buNone/>
-            </a:pPr>
-            <a:r>
-              <a:rPr lang="nl-NL" sz="2000" dirty="0">
-                <a:latin typeface="Courier New" panose="02070309020205020404" pitchFamily="49" charset="0"/>
-                <a:cs typeface="Courier New" panose="02070309020205020404" pitchFamily="49" charset="0"/>
-              </a:rPr>
-              <a:t>    </a:t>
-            </a:r>
-            <a:r>
-              <a:rPr lang="nl-NL" sz="2000" dirty="0" err="1">
-                <a:latin typeface="Courier New" panose="02070309020205020404" pitchFamily="49" charset="0"/>
-                <a:cs typeface="Courier New" panose="02070309020205020404" pitchFamily="49" charset="0"/>
-              </a:rPr>
-              <a:t>TransactieId</a:t>
-            </a:r>
-            <a:r>
-              <a:rPr lang="nl-NL" sz="2000" dirty="0">
-                <a:latin typeface="Courier New" panose="02070309020205020404" pitchFamily="49" charset="0"/>
-                <a:cs typeface="Courier New" panose="02070309020205020404" pitchFamily="49" charset="0"/>
-              </a:rPr>
-              <a:t>,</a:t>
-            </a:r>
-          </a:p>
-          <a:p>
-            <a:pPr marL="0" indent="0">
-              <a:buNone/>
-            </a:pPr>
-            <a:r>
-              <a:rPr lang="nl-NL" sz="2000" dirty="0">
-                <a:latin typeface="Courier New" panose="02070309020205020404" pitchFamily="49" charset="0"/>
-                <a:cs typeface="Courier New" panose="02070309020205020404" pitchFamily="49" charset="0"/>
-              </a:rPr>
-              <a:t>    </a:t>
-            </a:r>
-            <a:r>
-              <a:rPr lang="nl-NL" sz="2000" dirty="0" err="1">
-                <a:latin typeface="Courier New" panose="02070309020205020404" pitchFamily="49" charset="0"/>
-                <a:cs typeface="Courier New" panose="02070309020205020404" pitchFamily="49" charset="0"/>
-              </a:rPr>
-              <a:t>PrijsEx</a:t>
-            </a:r>
-            <a:r>
-              <a:rPr lang="nl-NL" sz="2000" dirty="0">
-                <a:latin typeface="Courier New" panose="02070309020205020404" pitchFamily="49" charset="0"/>
-                <a:cs typeface="Courier New" panose="02070309020205020404" pitchFamily="49" charset="0"/>
-              </a:rPr>
-              <a:t> + </a:t>
-            </a:r>
-            <a:r>
-              <a:rPr lang="nl-NL" sz="2000" dirty="0" err="1">
-                <a:latin typeface="Courier New" panose="02070309020205020404" pitchFamily="49" charset="0"/>
-                <a:cs typeface="Courier New" panose="02070309020205020404" pitchFamily="49" charset="0"/>
-              </a:rPr>
-              <a:t>BedragBTW</a:t>
-            </a:r>
-            <a:r>
-              <a:rPr lang="nl-NL" sz="2000" dirty="0">
-                <a:latin typeface="Courier New" panose="02070309020205020404" pitchFamily="49" charset="0"/>
-                <a:cs typeface="Courier New" panose="02070309020205020404" pitchFamily="49" charset="0"/>
-              </a:rPr>
-              <a:t> AS </a:t>
-            </a:r>
-            <a:r>
-              <a:rPr lang="nl-NL" sz="2000" dirty="0" err="1">
-                <a:latin typeface="Courier New" panose="02070309020205020404" pitchFamily="49" charset="0"/>
-                <a:cs typeface="Courier New" panose="02070309020205020404" pitchFamily="49" charset="0"/>
-              </a:rPr>
-              <a:t>PrijsInc</a:t>
-            </a:r>
-            <a:endParaRPr lang="nl-NL" sz="2000" dirty="0">
-              <a:latin typeface="Courier New" panose="02070309020205020404" pitchFamily="49" charset="0"/>
-              <a:cs typeface="Courier New" panose="02070309020205020404" pitchFamily="49" charset="0"/>
-            </a:endParaRPr>
-          </a:p>
-          <a:p>
-            <a:pPr marL="0" indent="0">
-              <a:buNone/>
-            </a:pPr>
-            <a:r>
-              <a:rPr lang="nl-NL" sz="2000" dirty="0">
-                <a:latin typeface="Courier New" panose="02070309020205020404" pitchFamily="49" charset="0"/>
-                <a:cs typeface="Courier New" panose="02070309020205020404" pitchFamily="49" charset="0"/>
-              </a:rPr>
-              <a:t>  FROM Transacties</a:t>
-            </a:r>
-          </a:p>
-          <a:p>
-            <a:pPr marL="0" indent="0">
-              <a:buNone/>
-            </a:pPr>
-            <a:r>
-              <a:rPr lang="nl-NL" sz="2000" dirty="0">
-                <a:latin typeface="Courier New" panose="02070309020205020404" pitchFamily="49" charset="0"/>
-                <a:cs typeface="Courier New" panose="02070309020205020404" pitchFamily="49" charset="0"/>
-              </a:rPr>
-              <a:t>)</a:t>
-            </a:r>
-          </a:p>
-          <a:p>
-            <a:pPr marL="0" indent="0">
-              <a:buNone/>
-            </a:pPr>
-            <a:r>
-              <a:rPr lang="nl-NL" sz="2000" dirty="0">
-                <a:latin typeface="Courier New" panose="02070309020205020404" pitchFamily="49" charset="0"/>
-                <a:cs typeface="Courier New" panose="02070309020205020404" pitchFamily="49" charset="0"/>
-              </a:rPr>
-              <a:t>WHERE </a:t>
-            </a:r>
-            <a:r>
-              <a:rPr lang="nl-NL" sz="2000" dirty="0" err="1">
-                <a:latin typeface="Courier New" panose="02070309020205020404" pitchFamily="49" charset="0"/>
-                <a:cs typeface="Courier New" panose="02070309020205020404" pitchFamily="49" charset="0"/>
-              </a:rPr>
-              <a:t>PrijsInc</a:t>
-            </a:r>
-            <a:r>
-              <a:rPr lang="nl-NL" sz="2000" dirty="0">
-                <a:latin typeface="Courier New" panose="02070309020205020404" pitchFamily="49" charset="0"/>
-                <a:cs typeface="Courier New" panose="02070309020205020404" pitchFamily="49" charset="0"/>
-              </a:rPr>
-              <a:t> &lt;= 10</a:t>
-            </a:r>
-          </a:p>
-          <a:p>
-            <a:pPr marL="0" indent="0">
-              <a:buNone/>
-            </a:pPr>
-            <a:r>
-              <a:rPr lang="nl-NL" sz="2000" dirty="0">
-                <a:latin typeface="Courier New" panose="02070309020205020404" pitchFamily="49" charset="0"/>
-                <a:cs typeface="Courier New" panose="02070309020205020404" pitchFamily="49" charset="0"/>
-              </a:rPr>
-              <a:t>;</a:t>
-            </a:r>
-          </a:p>
-        </p:txBody>
-      </p:sp>
-      <p:sp>
-        <p:nvSpPr>
           <p:cNvPr id="5" name="Content Placeholder 2">
             <a:extLst>
               <a:ext uri="{FF2B5EF4-FFF2-40B4-BE49-F238E27FC236}">
@@ -11686,8 +12038,8 @@
         </p:nvSpPr>
         <p:spPr>
           <a:xfrm>
-            <a:off x="7366570" y="1825625"/>
-            <a:ext cx="3987229" cy="4351338"/>
+            <a:off x="7154944" y="1825625"/>
+            <a:ext cx="4198855" cy="4351338"/>
           </a:xfrm>
           <a:prstGeom prst="rect">
             <a:avLst/>
@@ -11926,6 +12278,42 @@
           </a:p>
         </p:txBody>
       </p:sp>
+      <p:cxnSp>
+        <p:nvCxnSpPr>
+          <p:cNvPr id="7" name="Straight Connector 6">
+            <a:extLst>
+              <a:ext uri="{FF2B5EF4-FFF2-40B4-BE49-F238E27FC236}">
+                <a16:creationId xmlns:a16="http://schemas.microsoft.com/office/drawing/2014/main" id="{870905A5-C1C7-FDF6-67EA-D6B4FA8A35A0}"/>
+              </a:ext>
+            </a:extLst>
+          </p:cNvPr>
+          <p:cNvCxnSpPr/>
+          <p:nvPr/>
+        </p:nvCxnSpPr>
+        <p:spPr>
+          <a:xfrm>
+            <a:off x="6865255" y="1825625"/>
+            <a:ext cx="0" cy="4351338"/>
+          </a:xfrm>
+          <a:prstGeom prst="line">
+            <a:avLst/>
+          </a:prstGeom>
+        </p:spPr>
+        <p:style>
+          <a:lnRef idx="3">
+            <a:schemeClr val="dk1"/>
+          </a:lnRef>
+          <a:fillRef idx="0">
+            <a:schemeClr val="dk1"/>
+          </a:fillRef>
+          <a:effectRef idx="2">
+            <a:schemeClr val="dk1"/>
+          </a:effectRef>
+          <a:fontRef idx="minor">
+            <a:schemeClr val="tx1"/>
+          </a:fontRef>
+        </p:style>
+      </p:cxnSp>
     </p:spTree>
     <p:extLst>
       <p:ext uri="{BB962C8B-B14F-4D97-AF65-F5344CB8AC3E}">
@@ -12242,8 +12630,8 @@
         </p:nvSpPr>
         <p:spPr>
           <a:xfrm>
-            <a:off x="7366570" y="1825625"/>
-            <a:ext cx="3987229" cy="4351338"/>
+            <a:off x="7173798" y="1825625"/>
+            <a:ext cx="4180001" cy="4351338"/>
           </a:xfrm>
           <a:prstGeom prst="rect">
             <a:avLst/>
@@ -12541,6 +12929,42 @@
           </a:p>
         </p:txBody>
       </p:sp>
+      <p:cxnSp>
+        <p:nvCxnSpPr>
+          <p:cNvPr id="4" name="Straight Connector 3">
+            <a:extLst>
+              <a:ext uri="{FF2B5EF4-FFF2-40B4-BE49-F238E27FC236}">
+                <a16:creationId xmlns:a16="http://schemas.microsoft.com/office/drawing/2014/main" id="{B4793CAD-983B-9E11-D757-732A762C4AB9}"/>
+              </a:ext>
+            </a:extLst>
+          </p:cNvPr>
+          <p:cNvCxnSpPr/>
+          <p:nvPr/>
+        </p:nvCxnSpPr>
+        <p:spPr>
+          <a:xfrm>
+            <a:off x="6865255" y="1825625"/>
+            <a:ext cx="0" cy="4351338"/>
+          </a:xfrm>
+          <a:prstGeom prst="line">
+            <a:avLst/>
+          </a:prstGeom>
+        </p:spPr>
+        <p:style>
+          <a:lnRef idx="3">
+            <a:schemeClr val="dk1"/>
+          </a:lnRef>
+          <a:fillRef idx="0">
+            <a:schemeClr val="dk1"/>
+          </a:fillRef>
+          <a:effectRef idx="2">
+            <a:schemeClr val="dk1"/>
+          </a:effectRef>
+          <a:fontRef idx="minor">
+            <a:schemeClr val="tx1"/>
+          </a:fontRef>
+        </p:style>
+      </p:cxnSp>
     </p:spTree>
     <p:extLst>
       <p:ext uri="{BB962C8B-B14F-4D97-AF65-F5344CB8AC3E}">
@@ -13492,6 +13916,42 @@
           </a:p>
         </p:txBody>
       </p:sp>
+      <p:cxnSp>
+        <p:nvCxnSpPr>
+          <p:cNvPr id="4" name="Straight Connector 3">
+            <a:extLst>
+              <a:ext uri="{FF2B5EF4-FFF2-40B4-BE49-F238E27FC236}">
+                <a16:creationId xmlns:a16="http://schemas.microsoft.com/office/drawing/2014/main" id="{4689941C-9BC0-130B-E345-9A75135B8F8B}"/>
+              </a:ext>
+            </a:extLst>
+          </p:cNvPr>
+          <p:cNvCxnSpPr/>
+          <p:nvPr/>
+        </p:nvCxnSpPr>
+        <p:spPr>
+          <a:xfrm>
+            <a:off x="5830530" y="1825625"/>
+            <a:ext cx="0" cy="4351338"/>
+          </a:xfrm>
+          <a:prstGeom prst="line">
+            <a:avLst/>
+          </a:prstGeom>
+        </p:spPr>
+        <p:style>
+          <a:lnRef idx="3">
+            <a:schemeClr val="dk1"/>
+          </a:lnRef>
+          <a:fillRef idx="0">
+            <a:schemeClr val="dk1"/>
+          </a:fillRef>
+          <a:effectRef idx="2">
+            <a:schemeClr val="dk1"/>
+          </a:effectRef>
+          <a:fontRef idx="minor">
+            <a:schemeClr val="tx1"/>
+          </a:fontRef>
+        </p:style>
+      </p:cxnSp>
     </p:spTree>
     <p:extLst>
       <p:ext uri="{BB962C8B-B14F-4D97-AF65-F5344CB8AC3E}">
@@ -17639,7 +18099,7 @@
             </a:pPr>
             <a:r>
               <a:rPr lang="nl-NL" sz="2000" dirty="0"/>
-              <a:t>Beheer tabellen.</a:t>
+              <a:t>Beheer tabellen en rijen.</a:t>
             </a:r>
           </a:p>
           <a:p>
@@ -17653,19 +18113,8 @@
             </a:r>
           </a:p>
           <a:p>
-            <a:pPr>
-              <a:buFontTx/>
-              <a:buChar char="-"/>
-            </a:pPr>
-            <a:r>
-              <a:rPr lang="nl-NL" sz="2000" dirty="0"/>
-              <a:t>Bewerken van rijen.</a:t>
-            </a:r>
-          </a:p>
-          <a:p>
-            <a:pPr>
-              <a:buFontTx/>
-              <a:buChar char="-"/>
+            <a:pPr marL="0" indent="0">
+              <a:buNone/>
             </a:pPr>
             <a:endParaRPr lang="nl-NL" sz="2000" dirty="0"/>
           </a:p>
@@ -18048,7 +18497,7 @@
           <a:p>
             <a:r>
               <a:rPr lang="nl-NL" sz="3600" dirty="0"/>
-              <a:t>Meerdere tabellen koppelen</a:t>
+              <a:t>Tabellen koppelen</a:t>
             </a:r>
           </a:p>
         </p:txBody>
@@ -19280,7 +19729,7 @@
           <a:p>
             <a:r>
               <a:rPr lang="nl-NL" sz="3600" dirty="0"/>
-              <a:t>Koppelingen in 4 smaken</a:t>
+              <a:t>Vier soorten koppelingen</a:t>
             </a:r>
           </a:p>
         </p:txBody>
@@ -21756,7 +22205,7 @@
           <a:p>
             <a:r>
               <a:rPr lang="nl-NL" sz="3600" dirty="0"/>
-              <a:t>Syntax tabellen koppelen</a:t>
+              <a:t>Syntax koppelen</a:t>
             </a:r>
           </a:p>
         </p:txBody>
@@ -28481,493 +28930,6 @@
           </a:p>
         </p:txBody>
       </p:sp>
-      <p:graphicFrame>
-        <p:nvGraphicFramePr>
-          <p:cNvPr id="9" name="Table 9">
-            <a:extLst>
-              <a:ext uri="{FF2B5EF4-FFF2-40B4-BE49-F238E27FC236}">
-                <a16:creationId xmlns:a16="http://schemas.microsoft.com/office/drawing/2014/main" id="{087CED63-0024-496B-90EA-6179AA00022E}"/>
-              </a:ext>
-            </a:extLst>
-          </p:cNvPr>
-          <p:cNvGraphicFramePr>
-            <a:graphicFrameLocks noGrp="1"/>
-          </p:cNvGraphicFramePr>
-          <p:nvPr>
-            <p:extLst>
-              <p:ext uri="{D42A27DB-BD31-4B8C-83A1-F6EECF244321}">
-                <p14:modId xmlns:p14="http://schemas.microsoft.com/office/powerpoint/2010/main" val="369787290"/>
-              </p:ext>
-            </p:extLst>
-          </p:nvPr>
-        </p:nvGraphicFramePr>
-        <p:xfrm>
-          <a:off x="838200" y="3810516"/>
-          <a:ext cx="2151580" cy="1341120"/>
-        </p:xfrm>
-        <a:graphic>
-          <a:graphicData uri="http://schemas.openxmlformats.org/drawingml/2006/table">
-            <a:tbl>
-              <a:tblPr firstRow="1" bandRow="1">
-                <a:tableStyleId>{5C22544A-7EE6-4342-B048-85BDC9FD1C3A}</a:tableStyleId>
-              </a:tblPr>
-              <a:tblGrid>
-                <a:gridCol w="754294">
-                  <a:extLst>
-                    <a:ext uri="{9D8B030D-6E8A-4147-A177-3AD203B41FA5}">
-                      <a16:colId xmlns:a16="http://schemas.microsoft.com/office/drawing/2014/main" val="504571435"/>
-                    </a:ext>
-                  </a:extLst>
-                </a:gridCol>
-                <a:gridCol w="1397286">
-                  <a:extLst>
-                    <a:ext uri="{9D8B030D-6E8A-4147-A177-3AD203B41FA5}">
-                      <a16:colId xmlns:a16="http://schemas.microsoft.com/office/drawing/2014/main" val="2491559972"/>
-                    </a:ext>
-                  </a:extLst>
-                </a:gridCol>
-              </a:tblGrid>
-              <a:tr h="0">
-                <a:tc>
-                  <a:txBody>
-                    <a:bodyPr/>
-                    <a:lstStyle/>
-                    <a:p>
-                      <a:pPr algn="ctr"/>
-                      <a:r>
-                        <a:rPr lang="en-US" sz="1600" dirty="0"/>
-                        <a:t>ID</a:t>
-                      </a:r>
-                      <a:endParaRPr lang="en-NL" sz="1600" dirty="0"/>
-                    </a:p>
-                  </a:txBody>
-                  <a:tcPr/>
-                </a:tc>
-                <a:tc>
-                  <a:txBody>
-                    <a:bodyPr/>
-                    <a:lstStyle/>
-                    <a:p>
-                      <a:pPr algn="ctr"/>
-                      <a:r>
-                        <a:rPr lang="en-US" sz="1600" dirty="0"/>
-                        <a:t>Naam</a:t>
-                      </a:r>
-                      <a:endParaRPr lang="en-NL" sz="1600" dirty="0"/>
-                    </a:p>
-                  </a:txBody>
-                  <a:tcPr/>
-                </a:tc>
-                <a:extLst>
-                  <a:ext uri="{0D108BD9-81ED-4DB2-BD59-A6C34878D82A}">
-                    <a16:rowId xmlns:a16="http://schemas.microsoft.com/office/drawing/2014/main" val="3546219780"/>
-                  </a:ext>
-                </a:extLst>
-              </a:tr>
-              <a:tr h="302969">
-                <a:tc>
-                  <a:txBody>
-                    <a:bodyPr/>
-                    <a:lstStyle/>
-                    <a:p>
-                      <a:pPr algn="ctr"/>
-                      <a:r>
-                        <a:rPr lang="en-US" sz="1600" dirty="0"/>
-                        <a:t>1</a:t>
-                      </a:r>
-                      <a:endParaRPr lang="en-NL" sz="1600" dirty="0"/>
-                    </a:p>
-                  </a:txBody>
-                  <a:tcPr/>
-                </a:tc>
-                <a:tc>
-                  <a:txBody>
-                    <a:bodyPr/>
-                    <a:lstStyle/>
-                    <a:p>
-                      <a:pPr algn="ctr"/>
-                      <a:r>
-                        <a:rPr lang="en-US" sz="1600" dirty="0"/>
-                        <a:t>Anna</a:t>
-                      </a:r>
-                      <a:endParaRPr lang="en-NL" sz="1600" dirty="0"/>
-                    </a:p>
-                  </a:txBody>
-                  <a:tcPr/>
-                </a:tc>
-                <a:extLst>
-                  <a:ext uri="{0D108BD9-81ED-4DB2-BD59-A6C34878D82A}">
-                    <a16:rowId xmlns:a16="http://schemas.microsoft.com/office/drawing/2014/main" val="1999053236"/>
-                  </a:ext>
-                </a:extLst>
-              </a:tr>
-              <a:tr h="302969">
-                <a:tc>
-                  <a:txBody>
-                    <a:bodyPr/>
-                    <a:lstStyle/>
-                    <a:p>
-                      <a:pPr algn="ctr"/>
-                      <a:r>
-                        <a:rPr lang="en-US" sz="1600" dirty="0"/>
-                        <a:t>2</a:t>
-                      </a:r>
-                      <a:endParaRPr lang="en-NL" sz="1600" dirty="0"/>
-                    </a:p>
-                  </a:txBody>
-                  <a:tcPr/>
-                </a:tc>
-                <a:tc>
-                  <a:txBody>
-                    <a:bodyPr/>
-                    <a:lstStyle/>
-                    <a:p>
-                      <a:pPr algn="ctr"/>
-                      <a:r>
-                        <a:rPr lang="en-US" sz="1600" dirty="0"/>
-                        <a:t>Henk</a:t>
-                      </a:r>
-                      <a:endParaRPr lang="en-NL" sz="1600" dirty="0"/>
-                    </a:p>
-                  </a:txBody>
-                  <a:tcPr/>
-                </a:tc>
-                <a:extLst>
-                  <a:ext uri="{0D108BD9-81ED-4DB2-BD59-A6C34878D82A}">
-                    <a16:rowId xmlns:a16="http://schemas.microsoft.com/office/drawing/2014/main" val="2764142827"/>
-                  </a:ext>
-                </a:extLst>
-              </a:tr>
-              <a:tr h="302969">
-                <a:tc>
-                  <a:txBody>
-                    <a:bodyPr/>
-                    <a:lstStyle/>
-                    <a:p>
-                      <a:pPr algn="ctr"/>
-                      <a:r>
-                        <a:rPr lang="en-US" sz="1600" dirty="0"/>
-                        <a:t>3</a:t>
-                      </a:r>
-                      <a:endParaRPr lang="en-NL" sz="1600" dirty="0"/>
-                    </a:p>
-                  </a:txBody>
-                  <a:tcPr/>
-                </a:tc>
-                <a:tc>
-                  <a:txBody>
-                    <a:bodyPr/>
-                    <a:lstStyle/>
-                    <a:p>
-                      <a:pPr algn="ctr"/>
-                      <a:r>
-                        <a:rPr lang="en-US" sz="1600" dirty="0" err="1"/>
-                        <a:t>Fatih</a:t>
-                      </a:r>
-                      <a:endParaRPr lang="en-NL" sz="1600" dirty="0"/>
-                    </a:p>
-                  </a:txBody>
-                  <a:tcPr/>
-                </a:tc>
-                <a:extLst>
-                  <a:ext uri="{0D108BD9-81ED-4DB2-BD59-A6C34878D82A}">
-                    <a16:rowId xmlns:a16="http://schemas.microsoft.com/office/drawing/2014/main" val="2895410762"/>
-                  </a:ext>
-                </a:extLst>
-              </a:tr>
-            </a:tbl>
-          </a:graphicData>
-        </a:graphic>
-      </p:graphicFrame>
-      <p:graphicFrame>
-        <p:nvGraphicFramePr>
-          <p:cNvPr id="10" name="Table 9">
-            <a:extLst>
-              <a:ext uri="{FF2B5EF4-FFF2-40B4-BE49-F238E27FC236}">
-                <a16:creationId xmlns:a16="http://schemas.microsoft.com/office/drawing/2014/main" id="{5E1CC806-C7B3-4E13-BAF8-383DF5F33601}"/>
-              </a:ext>
-            </a:extLst>
-          </p:cNvPr>
-          <p:cNvGraphicFramePr>
-            <a:graphicFrameLocks noGrp="1"/>
-          </p:cNvGraphicFramePr>
-          <p:nvPr>
-            <p:extLst>
-              <p:ext uri="{D42A27DB-BD31-4B8C-83A1-F6EECF244321}">
-                <p14:modId xmlns:p14="http://schemas.microsoft.com/office/powerpoint/2010/main" val="758993813"/>
-              </p:ext>
-            </p:extLst>
-          </p:nvPr>
-        </p:nvGraphicFramePr>
-        <p:xfrm>
-          <a:off x="5568593" y="3810516"/>
-          <a:ext cx="5785207" cy="1341120"/>
-        </p:xfrm>
-        <a:graphic>
-          <a:graphicData uri="http://schemas.openxmlformats.org/drawingml/2006/table">
-            <a:tbl>
-              <a:tblPr firstRow="1" bandRow="1">
-                <a:tableStyleId>{5C22544A-7EE6-4342-B048-85BDC9FD1C3A}</a:tableStyleId>
-              </a:tblPr>
-              <a:tblGrid>
-                <a:gridCol w="730172">
-                  <a:extLst>
-                    <a:ext uri="{9D8B030D-6E8A-4147-A177-3AD203B41FA5}">
-                      <a16:colId xmlns:a16="http://schemas.microsoft.com/office/drawing/2014/main" val="2491559972"/>
-                    </a:ext>
-                  </a:extLst>
-                </a:gridCol>
-                <a:gridCol w="2660300">
-                  <a:extLst>
-                    <a:ext uri="{9D8B030D-6E8A-4147-A177-3AD203B41FA5}">
-                      <a16:colId xmlns:a16="http://schemas.microsoft.com/office/drawing/2014/main" val="1242195512"/>
-                    </a:ext>
-                  </a:extLst>
-                </a:gridCol>
-                <a:gridCol w="2394735">
-                  <a:extLst>
-                    <a:ext uri="{9D8B030D-6E8A-4147-A177-3AD203B41FA5}">
-                      <a16:colId xmlns:a16="http://schemas.microsoft.com/office/drawing/2014/main" val="2417860962"/>
-                    </a:ext>
-                  </a:extLst>
-                </a:gridCol>
-              </a:tblGrid>
-              <a:tr h="302969">
-                <a:tc>
-                  <a:txBody>
-                    <a:bodyPr/>
-                    <a:lstStyle/>
-                    <a:p>
-                      <a:pPr algn="ctr"/>
-                      <a:r>
-                        <a:rPr lang="en-US" sz="1600" dirty="0"/>
-                        <a:t>ID</a:t>
-                      </a:r>
-                      <a:endParaRPr lang="en-NL" sz="1600" dirty="0"/>
-                    </a:p>
-                  </a:txBody>
-                  <a:tcPr/>
-                </a:tc>
-                <a:tc>
-                  <a:txBody>
-                    <a:bodyPr/>
-                    <a:lstStyle/>
-                    <a:p>
-                      <a:pPr algn="l"/>
-                      <a:r>
-                        <a:rPr lang="en-US" sz="1600" dirty="0" err="1"/>
-                        <a:t>Titel</a:t>
-                      </a:r>
-                      <a:endParaRPr lang="en-NL" sz="1600" dirty="0"/>
-                    </a:p>
-                  </a:txBody>
-                  <a:tcPr/>
-                </a:tc>
-                <a:tc>
-                  <a:txBody>
-                    <a:bodyPr/>
-                    <a:lstStyle/>
-                    <a:p>
-                      <a:pPr algn="l"/>
-                      <a:r>
-                        <a:rPr lang="en-US" sz="1600" dirty="0"/>
-                        <a:t>Auteur</a:t>
-                      </a:r>
-                      <a:endParaRPr lang="en-NL" sz="1600" dirty="0"/>
-                    </a:p>
-                  </a:txBody>
-                  <a:tcPr/>
-                </a:tc>
-                <a:extLst>
-                  <a:ext uri="{0D108BD9-81ED-4DB2-BD59-A6C34878D82A}">
-                    <a16:rowId xmlns:a16="http://schemas.microsoft.com/office/drawing/2014/main" val="3546219780"/>
-                  </a:ext>
-                </a:extLst>
-              </a:tr>
-              <a:tr h="302969">
-                <a:tc>
-                  <a:txBody>
-                    <a:bodyPr/>
-                    <a:lstStyle/>
-                    <a:p>
-                      <a:pPr algn="ctr"/>
-                      <a:r>
-                        <a:rPr lang="en-US" sz="1600" dirty="0"/>
-                        <a:t>1</a:t>
-                      </a:r>
-                      <a:endParaRPr lang="en-NL" sz="1600" dirty="0"/>
-                    </a:p>
-                  </a:txBody>
-                  <a:tcPr/>
-                </a:tc>
-                <a:tc>
-                  <a:txBody>
-                    <a:bodyPr/>
-                    <a:lstStyle/>
-                    <a:p>
-                      <a:pPr algn="l"/>
-                      <a:r>
-                        <a:rPr lang="nl-NL" sz="1600" dirty="0"/>
-                        <a:t>Een beloofd land</a:t>
-                      </a:r>
-                      <a:endParaRPr lang="en-NL" sz="1600" dirty="0"/>
-                    </a:p>
-                  </a:txBody>
-                  <a:tcPr/>
-                </a:tc>
-                <a:tc>
-                  <a:txBody>
-                    <a:bodyPr/>
-                    <a:lstStyle/>
-                    <a:p>
-                      <a:pPr algn="l"/>
-                      <a:r>
-                        <a:rPr lang="en-US" sz="1600" dirty="0"/>
-                        <a:t>Barack Obama</a:t>
-                      </a:r>
-                      <a:endParaRPr lang="en-NL" sz="1600" dirty="0"/>
-                    </a:p>
-                  </a:txBody>
-                  <a:tcPr/>
-                </a:tc>
-                <a:extLst>
-                  <a:ext uri="{0D108BD9-81ED-4DB2-BD59-A6C34878D82A}">
-                    <a16:rowId xmlns:a16="http://schemas.microsoft.com/office/drawing/2014/main" val="1999053236"/>
-                  </a:ext>
-                </a:extLst>
-              </a:tr>
-              <a:tr h="302969">
-                <a:tc>
-                  <a:txBody>
-                    <a:bodyPr/>
-                    <a:lstStyle/>
-                    <a:p>
-                      <a:pPr algn="ctr"/>
-                      <a:r>
-                        <a:rPr lang="en-US" sz="1600" dirty="0"/>
-                        <a:t>2</a:t>
-                      </a:r>
-                      <a:endParaRPr lang="en-NL" sz="1600" dirty="0"/>
-                    </a:p>
-                  </a:txBody>
-                  <a:tcPr/>
-                </a:tc>
-                <a:tc>
-                  <a:txBody>
-                    <a:bodyPr/>
-                    <a:lstStyle/>
-                    <a:p>
-                      <a:pPr algn="l"/>
-                      <a:r>
-                        <a:rPr lang="nl-NL" sz="1600" dirty="0"/>
-                        <a:t>Opgewekt naar de eindstreep</a:t>
-                      </a:r>
-                      <a:endParaRPr lang="en-NL" sz="1600" dirty="0"/>
-                    </a:p>
-                  </a:txBody>
-                  <a:tcPr/>
-                </a:tc>
-                <a:tc>
-                  <a:txBody>
-                    <a:bodyPr/>
-                    <a:lstStyle/>
-                    <a:p>
-                      <a:pPr algn="l"/>
-                      <a:r>
-                        <a:rPr lang="nl-NL" sz="1600" dirty="0"/>
-                        <a:t>Hendrik Groen</a:t>
-                      </a:r>
-                      <a:endParaRPr lang="en-NL" sz="1600" dirty="0"/>
-                    </a:p>
-                  </a:txBody>
-                  <a:tcPr/>
-                </a:tc>
-                <a:extLst>
-                  <a:ext uri="{0D108BD9-81ED-4DB2-BD59-A6C34878D82A}">
-                    <a16:rowId xmlns:a16="http://schemas.microsoft.com/office/drawing/2014/main" val="2764142827"/>
-                  </a:ext>
-                </a:extLst>
-              </a:tr>
-              <a:tr h="302969">
-                <a:tc>
-                  <a:txBody>
-                    <a:bodyPr/>
-                    <a:lstStyle/>
-                    <a:p>
-                      <a:pPr algn="ctr"/>
-                      <a:r>
-                        <a:rPr lang="en-US" sz="1600" dirty="0"/>
-                        <a:t>3</a:t>
-                      </a:r>
-                      <a:endParaRPr lang="en-NL" sz="1600" dirty="0"/>
-                    </a:p>
-                  </a:txBody>
-                  <a:tcPr/>
-                </a:tc>
-                <a:tc>
-                  <a:txBody>
-                    <a:bodyPr/>
-                    <a:lstStyle/>
-                    <a:p>
-                      <a:pPr algn="l"/>
-                      <a:r>
-                        <a:rPr lang="nl-NL" sz="1600" dirty="0" err="1"/>
-                        <a:t>Revolusi</a:t>
-                      </a:r>
-                      <a:endParaRPr lang="nl-NL" sz="1600" dirty="0"/>
-                    </a:p>
-                  </a:txBody>
-                  <a:tcPr/>
-                </a:tc>
-                <a:tc>
-                  <a:txBody>
-                    <a:bodyPr/>
-                    <a:lstStyle/>
-                    <a:p>
-                      <a:pPr marL="0" marR="0" lvl="0" indent="0" algn="l" defTabSz="914400" rtl="0" eaLnBrk="1" fontAlgn="auto" latinLnBrk="0" hangingPunct="1">
-                        <a:lnSpc>
-                          <a:spcPct val="100000"/>
-                        </a:lnSpc>
-                        <a:spcBef>
-                          <a:spcPts val="0"/>
-                        </a:spcBef>
-                        <a:spcAft>
-                          <a:spcPts val="0"/>
-                        </a:spcAft>
-                        <a:buClrTx/>
-                        <a:buSzTx/>
-                        <a:buFontTx/>
-                        <a:buNone/>
-                        <a:tabLst/>
-                        <a:defRPr/>
-                      </a:pPr>
-                      <a:r>
-                        <a:rPr lang="nl-NL" sz="1600" dirty="0"/>
-                        <a:t>David Van </a:t>
-                      </a:r>
-                      <a:r>
-                        <a:rPr lang="nl-NL" sz="1600" dirty="0" err="1"/>
-                        <a:t>Reybrouck</a:t>
-                      </a:r>
-                      <a:r>
-                        <a:rPr lang="nl-NL" sz="1600" dirty="0"/>
-                        <a:t> </a:t>
-                      </a:r>
-                      <a:endParaRPr lang="en-NL" sz="1600" dirty="0"/>
-                    </a:p>
-                  </a:txBody>
-                  <a:tcPr/>
-                </a:tc>
-                <a:extLst>
-                  <a:ext uri="{0D108BD9-81ED-4DB2-BD59-A6C34878D82A}">
-                    <a16:rowId xmlns:a16="http://schemas.microsoft.com/office/drawing/2014/main" val="2895410762"/>
-                  </a:ext>
-                </a:extLst>
-              </a:tr>
-            </a:tbl>
-          </a:graphicData>
-        </a:graphic>
-      </p:graphicFrame>
       <p:sp>
         <p:nvSpPr>
           <p:cNvPr id="21" name="TextBox 20">
@@ -29077,7 +29039,7 @@
         <p:spPr>
           <a:xfrm>
             <a:off x="838200" y="3482280"/>
-            <a:ext cx="1205971" cy="369332"/>
+            <a:ext cx="1058303" cy="369332"/>
           </a:xfrm>
           <a:prstGeom prst="rect">
             <a:avLst/>
@@ -29092,7 +29054,7 @@
           <a:p>
             <a:r>
               <a:rPr lang="en-US" dirty="0"/>
-              <a:t>PERSONEN</a:t>
+              <a:t>KLANTEN</a:t>
             </a:r>
             <a:endParaRPr lang="en-NL" dirty="0"/>
           </a:p>
@@ -29134,6 +29096,493 @@
           </a:p>
         </p:txBody>
       </p:sp>
+      <p:graphicFrame>
+        <p:nvGraphicFramePr>
+          <p:cNvPr id="5" name="Table 9">
+            <a:extLst>
+              <a:ext uri="{FF2B5EF4-FFF2-40B4-BE49-F238E27FC236}">
+                <a16:creationId xmlns:a16="http://schemas.microsoft.com/office/drawing/2014/main" id="{DE905074-C8A8-61E4-9E99-F3753F57AE78}"/>
+              </a:ext>
+            </a:extLst>
+          </p:cNvPr>
+          <p:cNvGraphicFramePr>
+            <a:graphicFrameLocks noGrp="1"/>
+          </p:cNvGraphicFramePr>
+          <p:nvPr>
+            <p:extLst>
+              <p:ext uri="{D42A27DB-BD31-4B8C-83A1-F6EECF244321}">
+                <p14:modId xmlns:p14="http://schemas.microsoft.com/office/powerpoint/2010/main" val="2125559999"/>
+              </p:ext>
+            </p:extLst>
+          </p:nvPr>
+        </p:nvGraphicFramePr>
+        <p:xfrm>
+          <a:off x="838200" y="3810516"/>
+          <a:ext cx="2151580" cy="1341120"/>
+        </p:xfrm>
+        <a:graphic>
+          <a:graphicData uri="http://schemas.openxmlformats.org/drawingml/2006/table">
+            <a:tbl>
+              <a:tblPr firstRow="1" bandRow="1">
+                <a:tableStyleId>{5C22544A-7EE6-4342-B048-85BDC9FD1C3A}</a:tableStyleId>
+              </a:tblPr>
+              <a:tblGrid>
+                <a:gridCol w="1047161">
+                  <a:extLst>
+                    <a:ext uri="{9D8B030D-6E8A-4147-A177-3AD203B41FA5}">
+                      <a16:colId xmlns:a16="http://schemas.microsoft.com/office/drawing/2014/main" val="504571435"/>
+                    </a:ext>
+                  </a:extLst>
+                </a:gridCol>
+                <a:gridCol w="1104419">
+                  <a:extLst>
+                    <a:ext uri="{9D8B030D-6E8A-4147-A177-3AD203B41FA5}">
+                      <a16:colId xmlns:a16="http://schemas.microsoft.com/office/drawing/2014/main" val="2491559972"/>
+                    </a:ext>
+                  </a:extLst>
+                </a:gridCol>
+              </a:tblGrid>
+              <a:tr h="0">
+                <a:tc>
+                  <a:txBody>
+                    <a:bodyPr/>
+                    <a:lstStyle/>
+                    <a:p>
+                      <a:pPr algn="ctr"/>
+                      <a:r>
+                        <a:rPr lang="en-US" sz="1600" dirty="0" err="1"/>
+                        <a:t>KlantID</a:t>
+                      </a:r>
+                      <a:endParaRPr lang="en-NL" sz="1600" dirty="0"/>
+                    </a:p>
+                  </a:txBody>
+                  <a:tcPr/>
+                </a:tc>
+                <a:tc>
+                  <a:txBody>
+                    <a:bodyPr/>
+                    <a:lstStyle/>
+                    <a:p>
+                      <a:pPr algn="ctr"/>
+                      <a:r>
+                        <a:rPr lang="en-US" sz="1600" dirty="0"/>
+                        <a:t>Naam</a:t>
+                      </a:r>
+                      <a:endParaRPr lang="en-NL" sz="1600" dirty="0"/>
+                    </a:p>
+                  </a:txBody>
+                  <a:tcPr/>
+                </a:tc>
+                <a:extLst>
+                  <a:ext uri="{0D108BD9-81ED-4DB2-BD59-A6C34878D82A}">
+                    <a16:rowId xmlns:a16="http://schemas.microsoft.com/office/drawing/2014/main" val="3546219780"/>
+                  </a:ext>
+                </a:extLst>
+              </a:tr>
+              <a:tr h="302969">
+                <a:tc>
+                  <a:txBody>
+                    <a:bodyPr/>
+                    <a:lstStyle/>
+                    <a:p>
+                      <a:pPr algn="ctr"/>
+                      <a:r>
+                        <a:rPr lang="en-US" sz="1600" dirty="0"/>
+                        <a:t>1</a:t>
+                      </a:r>
+                      <a:endParaRPr lang="en-NL" sz="1600" dirty="0"/>
+                    </a:p>
+                  </a:txBody>
+                  <a:tcPr/>
+                </a:tc>
+                <a:tc>
+                  <a:txBody>
+                    <a:bodyPr/>
+                    <a:lstStyle/>
+                    <a:p>
+                      <a:pPr algn="ctr"/>
+                      <a:r>
+                        <a:rPr lang="en-US" sz="1600" dirty="0"/>
+                        <a:t>Anna</a:t>
+                      </a:r>
+                      <a:endParaRPr lang="en-NL" sz="1600" dirty="0"/>
+                    </a:p>
+                  </a:txBody>
+                  <a:tcPr/>
+                </a:tc>
+                <a:extLst>
+                  <a:ext uri="{0D108BD9-81ED-4DB2-BD59-A6C34878D82A}">
+                    <a16:rowId xmlns:a16="http://schemas.microsoft.com/office/drawing/2014/main" val="1999053236"/>
+                  </a:ext>
+                </a:extLst>
+              </a:tr>
+              <a:tr h="302969">
+                <a:tc>
+                  <a:txBody>
+                    <a:bodyPr/>
+                    <a:lstStyle/>
+                    <a:p>
+                      <a:pPr algn="ctr"/>
+                      <a:r>
+                        <a:rPr lang="en-US" sz="1600" dirty="0"/>
+                        <a:t>2</a:t>
+                      </a:r>
+                      <a:endParaRPr lang="en-NL" sz="1600" dirty="0"/>
+                    </a:p>
+                  </a:txBody>
+                  <a:tcPr/>
+                </a:tc>
+                <a:tc>
+                  <a:txBody>
+                    <a:bodyPr/>
+                    <a:lstStyle/>
+                    <a:p>
+                      <a:pPr algn="ctr"/>
+                      <a:r>
+                        <a:rPr lang="en-US" sz="1600" dirty="0"/>
+                        <a:t>Henk</a:t>
+                      </a:r>
+                      <a:endParaRPr lang="en-NL" sz="1600" dirty="0"/>
+                    </a:p>
+                  </a:txBody>
+                  <a:tcPr/>
+                </a:tc>
+                <a:extLst>
+                  <a:ext uri="{0D108BD9-81ED-4DB2-BD59-A6C34878D82A}">
+                    <a16:rowId xmlns:a16="http://schemas.microsoft.com/office/drawing/2014/main" val="2764142827"/>
+                  </a:ext>
+                </a:extLst>
+              </a:tr>
+              <a:tr h="302969">
+                <a:tc>
+                  <a:txBody>
+                    <a:bodyPr/>
+                    <a:lstStyle/>
+                    <a:p>
+                      <a:pPr algn="ctr"/>
+                      <a:r>
+                        <a:rPr lang="en-US" sz="1600" dirty="0"/>
+                        <a:t>3</a:t>
+                      </a:r>
+                      <a:endParaRPr lang="en-NL" sz="1600" dirty="0"/>
+                    </a:p>
+                  </a:txBody>
+                  <a:tcPr/>
+                </a:tc>
+                <a:tc>
+                  <a:txBody>
+                    <a:bodyPr/>
+                    <a:lstStyle/>
+                    <a:p>
+                      <a:pPr algn="ctr"/>
+                      <a:r>
+                        <a:rPr lang="en-US" sz="1600" dirty="0" err="1"/>
+                        <a:t>Fatih</a:t>
+                      </a:r>
+                      <a:endParaRPr lang="en-NL" sz="1600" dirty="0"/>
+                    </a:p>
+                  </a:txBody>
+                  <a:tcPr/>
+                </a:tc>
+                <a:extLst>
+                  <a:ext uri="{0D108BD9-81ED-4DB2-BD59-A6C34878D82A}">
+                    <a16:rowId xmlns:a16="http://schemas.microsoft.com/office/drawing/2014/main" val="2895410762"/>
+                  </a:ext>
+                </a:extLst>
+              </a:tr>
+            </a:tbl>
+          </a:graphicData>
+        </a:graphic>
+      </p:graphicFrame>
+      <p:graphicFrame>
+        <p:nvGraphicFramePr>
+          <p:cNvPr id="6" name="Table 5">
+            <a:extLst>
+              <a:ext uri="{FF2B5EF4-FFF2-40B4-BE49-F238E27FC236}">
+                <a16:creationId xmlns:a16="http://schemas.microsoft.com/office/drawing/2014/main" id="{192D76D5-A164-56DF-247C-D59AA4EE3504}"/>
+              </a:ext>
+            </a:extLst>
+          </p:cNvPr>
+          <p:cNvGraphicFramePr>
+            <a:graphicFrameLocks noGrp="1"/>
+          </p:cNvGraphicFramePr>
+          <p:nvPr>
+            <p:extLst>
+              <p:ext uri="{D42A27DB-BD31-4B8C-83A1-F6EECF244321}">
+                <p14:modId xmlns:p14="http://schemas.microsoft.com/office/powerpoint/2010/main" val="1304095198"/>
+              </p:ext>
+            </p:extLst>
+          </p:nvPr>
+        </p:nvGraphicFramePr>
+        <p:xfrm>
+          <a:off x="5568593" y="3810516"/>
+          <a:ext cx="5785207" cy="1341120"/>
+        </p:xfrm>
+        <a:graphic>
+          <a:graphicData uri="http://schemas.openxmlformats.org/drawingml/2006/table">
+            <a:tbl>
+              <a:tblPr firstRow="1" bandRow="1">
+                <a:tableStyleId>{5C22544A-7EE6-4342-B048-85BDC9FD1C3A}</a:tableStyleId>
+              </a:tblPr>
+              <a:tblGrid>
+                <a:gridCol w="945329">
+                  <a:extLst>
+                    <a:ext uri="{9D8B030D-6E8A-4147-A177-3AD203B41FA5}">
+                      <a16:colId xmlns:a16="http://schemas.microsoft.com/office/drawing/2014/main" val="2491559972"/>
+                    </a:ext>
+                  </a:extLst>
+                </a:gridCol>
+                <a:gridCol w="2809187">
+                  <a:extLst>
+                    <a:ext uri="{9D8B030D-6E8A-4147-A177-3AD203B41FA5}">
+                      <a16:colId xmlns:a16="http://schemas.microsoft.com/office/drawing/2014/main" val="1242195512"/>
+                    </a:ext>
+                  </a:extLst>
+                </a:gridCol>
+                <a:gridCol w="2030691">
+                  <a:extLst>
+                    <a:ext uri="{9D8B030D-6E8A-4147-A177-3AD203B41FA5}">
+                      <a16:colId xmlns:a16="http://schemas.microsoft.com/office/drawing/2014/main" val="2417860962"/>
+                    </a:ext>
+                  </a:extLst>
+                </a:gridCol>
+              </a:tblGrid>
+              <a:tr h="302969">
+                <a:tc>
+                  <a:txBody>
+                    <a:bodyPr/>
+                    <a:lstStyle/>
+                    <a:p>
+                      <a:pPr algn="ctr"/>
+                      <a:r>
+                        <a:rPr lang="en-US" sz="1600" dirty="0" err="1"/>
+                        <a:t>BoekID</a:t>
+                      </a:r>
+                      <a:endParaRPr lang="en-NL" sz="1600" dirty="0"/>
+                    </a:p>
+                  </a:txBody>
+                  <a:tcPr/>
+                </a:tc>
+                <a:tc>
+                  <a:txBody>
+                    <a:bodyPr/>
+                    <a:lstStyle/>
+                    <a:p>
+                      <a:pPr algn="l"/>
+                      <a:r>
+                        <a:rPr lang="en-US" sz="1600" dirty="0" err="1"/>
+                        <a:t>Titel</a:t>
+                      </a:r>
+                      <a:endParaRPr lang="en-NL" sz="1600" dirty="0"/>
+                    </a:p>
+                  </a:txBody>
+                  <a:tcPr/>
+                </a:tc>
+                <a:tc>
+                  <a:txBody>
+                    <a:bodyPr/>
+                    <a:lstStyle/>
+                    <a:p>
+                      <a:pPr algn="l"/>
+                      <a:r>
+                        <a:rPr lang="en-US" sz="1600" dirty="0"/>
+                        <a:t>Auteur</a:t>
+                      </a:r>
+                      <a:endParaRPr lang="en-NL" sz="1600" dirty="0"/>
+                    </a:p>
+                  </a:txBody>
+                  <a:tcPr/>
+                </a:tc>
+                <a:extLst>
+                  <a:ext uri="{0D108BD9-81ED-4DB2-BD59-A6C34878D82A}">
+                    <a16:rowId xmlns:a16="http://schemas.microsoft.com/office/drawing/2014/main" val="3546219780"/>
+                  </a:ext>
+                </a:extLst>
+              </a:tr>
+              <a:tr h="302969">
+                <a:tc>
+                  <a:txBody>
+                    <a:bodyPr/>
+                    <a:lstStyle/>
+                    <a:p>
+                      <a:pPr algn="ctr"/>
+                      <a:r>
+                        <a:rPr lang="en-US" sz="1600" dirty="0"/>
+                        <a:t>1</a:t>
+                      </a:r>
+                      <a:endParaRPr lang="en-NL" sz="1600" dirty="0"/>
+                    </a:p>
+                  </a:txBody>
+                  <a:tcPr/>
+                </a:tc>
+                <a:tc>
+                  <a:txBody>
+                    <a:bodyPr/>
+                    <a:lstStyle/>
+                    <a:p>
+                      <a:pPr algn="l"/>
+                      <a:r>
+                        <a:rPr lang="nl-NL" sz="1600" dirty="0"/>
+                        <a:t>Een beloofd land</a:t>
+                      </a:r>
+                      <a:endParaRPr lang="en-NL" sz="1600" dirty="0"/>
+                    </a:p>
+                  </a:txBody>
+                  <a:tcPr/>
+                </a:tc>
+                <a:tc>
+                  <a:txBody>
+                    <a:bodyPr/>
+                    <a:lstStyle/>
+                    <a:p>
+                      <a:pPr algn="l"/>
+                      <a:r>
+                        <a:rPr lang="en-US" sz="1600" dirty="0"/>
+                        <a:t>Barack Obama</a:t>
+                      </a:r>
+                      <a:endParaRPr lang="en-NL" sz="1600" dirty="0"/>
+                    </a:p>
+                  </a:txBody>
+                  <a:tcPr/>
+                </a:tc>
+                <a:extLst>
+                  <a:ext uri="{0D108BD9-81ED-4DB2-BD59-A6C34878D82A}">
+                    <a16:rowId xmlns:a16="http://schemas.microsoft.com/office/drawing/2014/main" val="1999053236"/>
+                  </a:ext>
+                </a:extLst>
+              </a:tr>
+              <a:tr h="302969">
+                <a:tc>
+                  <a:txBody>
+                    <a:bodyPr/>
+                    <a:lstStyle/>
+                    <a:p>
+                      <a:pPr algn="ctr"/>
+                      <a:r>
+                        <a:rPr lang="en-US" sz="1600" dirty="0"/>
+                        <a:t>2</a:t>
+                      </a:r>
+                      <a:endParaRPr lang="en-NL" sz="1600" dirty="0"/>
+                    </a:p>
+                  </a:txBody>
+                  <a:tcPr/>
+                </a:tc>
+                <a:tc>
+                  <a:txBody>
+                    <a:bodyPr/>
+                    <a:lstStyle/>
+                    <a:p>
+                      <a:pPr algn="l"/>
+                      <a:r>
+                        <a:rPr lang="nl-NL" sz="1600" dirty="0"/>
+                        <a:t>Opgewekt naar de eindstreep</a:t>
+                      </a:r>
+                      <a:endParaRPr lang="en-NL" sz="1600" dirty="0"/>
+                    </a:p>
+                  </a:txBody>
+                  <a:tcPr/>
+                </a:tc>
+                <a:tc>
+                  <a:txBody>
+                    <a:bodyPr/>
+                    <a:lstStyle/>
+                    <a:p>
+                      <a:pPr algn="l"/>
+                      <a:r>
+                        <a:rPr lang="nl-NL" sz="1600" dirty="0"/>
+                        <a:t>Hendrik Groen</a:t>
+                      </a:r>
+                      <a:endParaRPr lang="en-NL" sz="1600" dirty="0"/>
+                    </a:p>
+                  </a:txBody>
+                  <a:tcPr/>
+                </a:tc>
+                <a:extLst>
+                  <a:ext uri="{0D108BD9-81ED-4DB2-BD59-A6C34878D82A}">
+                    <a16:rowId xmlns:a16="http://schemas.microsoft.com/office/drawing/2014/main" val="2764142827"/>
+                  </a:ext>
+                </a:extLst>
+              </a:tr>
+              <a:tr h="302969">
+                <a:tc>
+                  <a:txBody>
+                    <a:bodyPr/>
+                    <a:lstStyle/>
+                    <a:p>
+                      <a:pPr algn="ctr"/>
+                      <a:r>
+                        <a:rPr lang="en-US" sz="1600" dirty="0"/>
+                        <a:t>3</a:t>
+                      </a:r>
+                      <a:endParaRPr lang="en-NL" sz="1600" dirty="0"/>
+                    </a:p>
+                  </a:txBody>
+                  <a:tcPr/>
+                </a:tc>
+                <a:tc>
+                  <a:txBody>
+                    <a:bodyPr/>
+                    <a:lstStyle/>
+                    <a:p>
+                      <a:pPr algn="l"/>
+                      <a:r>
+                        <a:rPr lang="nl-NL" sz="1600" dirty="0" err="1"/>
+                        <a:t>Revolusi</a:t>
+                      </a:r>
+                      <a:endParaRPr lang="nl-NL" sz="1600" dirty="0"/>
+                    </a:p>
+                  </a:txBody>
+                  <a:tcPr/>
+                </a:tc>
+                <a:tc>
+                  <a:txBody>
+                    <a:bodyPr/>
+                    <a:lstStyle/>
+                    <a:p>
+                      <a:pPr marL="0" marR="0" lvl="0" indent="0" algn="l" defTabSz="914400" rtl="0" eaLnBrk="1" fontAlgn="auto" latinLnBrk="0" hangingPunct="1">
+                        <a:lnSpc>
+                          <a:spcPct val="100000"/>
+                        </a:lnSpc>
+                        <a:spcBef>
+                          <a:spcPts val="0"/>
+                        </a:spcBef>
+                        <a:spcAft>
+                          <a:spcPts val="0"/>
+                        </a:spcAft>
+                        <a:buClrTx/>
+                        <a:buSzTx/>
+                        <a:buFontTx/>
+                        <a:buNone/>
+                        <a:tabLst/>
+                        <a:defRPr/>
+                      </a:pPr>
+                      <a:r>
+                        <a:rPr lang="nl-NL" sz="1600" dirty="0"/>
+                        <a:t>David Van </a:t>
+                      </a:r>
+                      <a:r>
+                        <a:rPr lang="nl-NL" sz="1600" dirty="0" err="1"/>
+                        <a:t>Reybrouck</a:t>
+                      </a:r>
+                      <a:r>
+                        <a:rPr lang="nl-NL" sz="1600" dirty="0"/>
+                        <a:t> </a:t>
+                      </a:r>
+                      <a:endParaRPr lang="en-NL" sz="1600" dirty="0"/>
+                    </a:p>
+                  </a:txBody>
+                  <a:tcPr/>
+                </a:tc>
+                <a:extLst>
+                  <a:ext uri="{0D108BD9-81ED-4DB2-BD59-A6C34878D82A}">
+                    <a16:rowId xmlns:a16="http://schemas.microsoft.com/office/drawing/2014/main" val="2895410762"/>
+                  </a:ext>
+                </a:extLst>
+              </a:tr>
+            </a:tbl>
+          </a:graphicData>
+        </a:graphic>
+      </p:graphicFrame>
     </p:spTree>
     <p:extLst>
       <p:ext uri="{BB962C8B-B14F-4D97-AF65-F5344CB8AC3E}">
@@ -32128,24 +32577,21 @@
             </a:pPr>
             <a:r>
               <a:rPr lang="nl-NL" sz="2000" dirty="0"/>
-              <a:t>In de praktijk veel variaties in de details… </a:t>
-            </a:r>
+              <a:t>In de praktijk wel verschillen in de details.</a:t>
+            </a:r>
+            <a:endParaRPr lang="nl-NL" sz="2000" dirty="0">
+              <a:sym typeface="Wingdings" panose="05000000000000000000" pitchFamily="2" charset="2"/>
+            </a:endParaRPr>
+          </a:p>
+          <a:p>
+            <a:pPr marL="0" indent="0">
+              <a:buNone/>
+            </a:pPr>
             <a:r>
               <a:rPr lang="nl-NL" sz="2000" dirty="0">
                 <a:sym typeface="Wingdings" panose="05000000000000000000" pitchFamily="2" charset="2"/>
               </a:rPr>
-              <a:t></a:t>
-            </a:r>
-          </a:p>
-          <a:p>
-            <a:pPr marL="0" indent="0">
-              <a:buNone/>
-            </a:pPr>
-            <a:r>
-              <a:rPr lang="nl-NL" sz="2000" dirty="0">
-                <a:sym typeface="Wingdings" panose="05000000000000000000" pitchFamily="2" charset="2"/>
-              </a:rPr>
-              <a:t>Verschillen in: syntax, data types, functies…</a:t>
+              <a:t>Onder andere in: syntax, data types, functies…</a:t>
             </a:r>
             <a:endParaRPr lang="nl-NL" sz="2000" dirty="0"/>
           </a:p>
@@ -33698,15 +34144,7 @@
             </a:r>
             <a:r>
               <a:rPr lang="nl-NL" sz="2000" dirty="0"/>
-              <a:t> van </a:t>
-            </a:r>
-            <a:r>
-              <a:rPr lang="nl-NL" sz="2000" u="sng" dirty="0"/>
-              <a:t>sleutel</a:t>
-            </a:r>
-            <a:r>
-              <a:rPr lang="nl-NL" sz="2000" dirty="0"/>
-              <a:t>.</a:t>
+              <a:t> van sleutel kolommen.</a:t>
             </a:r>
           </a:p>
           <a:p>
@@ -33716,7 +34154,7 @@
             </a:pPr>
             <a:r>
               <a:rPr lang="nl-NL" sz="1800" dirty="0"/>
-              <a:t>Naam en geslacht afhankelijk van </a:t>
+              <a:t>Naam en geslacht hangen samen met </a:t>
             </a:r>
             <a:r>
               <a:rPr lang="nl-NL" sz="1800" dirty="0" err="1"/>
@@ -33734,7 +34172,7 @@
             </a:pPr>
             <a:r>
               <a:rPr lang="nl-NL" sz="1800" dirty="0"/>
-              <a:t>Maar: Aanhef is alleen afhankelijk van Geslacht.</a:t>
+              <a:t>Maar: Aanhef hangt samen met Geslacht.</a:t>
             </a:r>
           </a:p>
           <a:p>
@@ -34320,15 +34758,15 @@
               <a:buChar char="-"/>
             </a:pPr>
             <a:r>
-              <a:rPr lang="nl-NL" sz="2000" dirty="0"/>
+              <a:rPr lang="nl-NL" sz="1800" dirty="0"/>
               <a:t>Naam en geslacht hangen samen met </a:t>
             </a:r>
             <a:r>
-              <a:rPr lang="nl-NL" sz="2000" dirty="0" err="1"/>
+              <a:rPr lang="nl-NL" sz="1800" dirty="0" err="1"/>
               <a:t>StudentID</a:t>
             </a:r>
             <a:r>
-              <a:rPr lang="nl-NL" sz="2000" dirty="0"/>
+              <a:rPr lang="nl-NL" sz="1800" dirty="0"/>
               <a:t>.</a:t>
             </a:r>
           </a:p>
@@ -34338,7 +34776,7 @@
               <a:buChar char="-"/>
             </a:pPr>
             <a:r>
-              <a:rPr lang="nl-NL" sz="2000" dirty="0"/>
+              <a:rPr lang="nl-NL" sz="1800" dirty="0"/>
               <a:t>Maar: Aanhef hangt samen met Geslacht.</a:t>
             </a:r>
           </a:p>
@@ -34348,7 +34786,7 @@
               <a:buChar char="-"/>
             </a:pPr>
             <a:r>
-              <a:rPr lang="nl-NL" sz="2000" dirty="0"/>
+              <a:rPr lang="nl-NL" sz="1800" dirty="0"/>
               <a:t>Resultaat: Veel dubbele waardes.</a:t>
             </a:r>
           </a:p>
@@ -36136,7 +36574,7 @@
         <p:spPr>
           <a:xfrm>
             <a:off x="3000054" y="3796152"/>
-            <a:ext cx="3575851" cy="400110"/>
+            <a:ext cx="4380366" cy="400110"/>
           </a:xfrm>
           <a:prstGeom prst="rect">
             <a:avLst/>
@@ -36151,7 +36589,7 @@
           <a:p>
             <a:r>
               <a:rPr lang="nl-NL" sz="2000" dirty="0"/>
-              <a:t>Koppelt aan 1 record in de tabel.</a:t>
+              <a:t>Koppelt aan precies 1 record in de tabel.</a:t>
             </a:r>
           </a:p>
         </p:txBody>
@@ -38294,7 +38732,7 @@
           <a:p>
             <a:r>
               <a:rPr lang="nl-NL" sz="3600" dirty="0"/>
-              <a:t>Altijd een “tabel”</a:t>
+              <a:t>Altijd een tabel</a:t>
             </a:r>
           </a:p>
         </p:txBody>
@@ -39669,6 +40107,44 @@
           </a:p>
         </p:txBody>
       </p:sp>
+      <p:cxnSp>
+        <p:nvCxnSpPr>
+          <p:cNvPr id="6" name="Straight Connector 5">
+            <a:extLst>
+              <a:ext uri="{FF2B5EF4-FFF2-40B4-BE49-F238E27FC236}">
+                <a16:creationId xmlns:a16="http://schemas.microsoft.com/office/drawing/2014/main" id="{E1847799-98E1-7173-5DD9-A2E01D1C3B6D}"/>
+              </a:ext>
+            </a:extLst>
+          </p:cNvPr>
+          <p:cNvCxnSpPr>
+            <a:cxnSpLocks/>
+          </p:cNvCxnSpPr>
+          <p:nvPr/>
+        </p:nvCxnSpPr>
+        <p:spPr>
+          <a:xfrm>
+            <a:off x="5740924" y="1825625"/>
+            <a:ext cx="0" cy="4351338"/>
+          </a:xfrm>
+          <a:prstGeom prst="line">
+            <a:avLst/>
+          </a:prstGeom>
+        </p:spPr>
+        <p:style>
+          <a:lnRef idx="3">
+            <a:schemeClr val="dk1"/>
+          </a:lnRef>
+          <a:fillRef idx="0">
+            <a:schemeClr val="dk1"/>
+          </a:fillRef>
+          <a:effectRef idx="2">
+            <a:schemeClr val="dk1"/>
+          </a:effectRef>
+          <a:fontRef idx="minor">
+            <a:schemeClr val="tx1"/>
+          </a:fontRef>
+        </p:style>
+      </p:cxnSp>
     </p:spTree>
     <p:extLst>
       <p:ext uri="{BB962C8B-B14F-4D97-AF65-F5344CB8AC3E}">
@@ -40114,6 +40590,44 @@
           </a:p>
         </p:txBody>
       </p:sp>
+      <p:cxnSp>
+        <p:nvCxnSpPr>
+          <p:cNvPr id="4" name="Straight Connector 3">
+            <a:extLst>
+              <a:ext uri="{FF2B5EF4-FFF2-40B4-BE49-F238E27FC236}">
+                <a16:creationId xmlns:a16="http://schemas.microsoft.com/office/drawing/2014/main" id="{FAB72123-2C70-9FA3-AAD5-4AF04CB51962}"/>
+              </a:ext>
+            </a:extLst>
+          </p:cNvPr>
+          <p:cNvCxnSpPr>
+            <a:cxnSpLocks/>
+          </p:cNvCxnSpPr>
+          <p:nvPr/>
+        </p:nvCxnSpPr>
+        <p:spPr>
+          <a:xfrm>
+            <a:off x="5740924" y="1825625"/>
+            <a:ext cx="0" cy="4351338"/>
+          </a:xfrm>
+          <a:prstGeom prst="line">
+            <a:avLst/>
+          </a:prstGeom>
+        </p:spPr>
+        <p:style>
+          <a:lnRef idx="3">
+            <a:schemeClr val="dk1"/>
+          </a:lnRef>
+          <a:fillRef idx="0">
+            <a:schemeClr val="dk1"/>
+          </a:fillRef>
+          <a:effectRef idx="2">
+            <a:schemeClr val="dk1"/>
+          </a:effectRef>
+          <a:fontRef idx="minor">
+            <a:schemeClr val="tx1"/>
+          </a:fontRef>
+        </p:style>
+      </p:cxnSp>
     </p:spTree>
     <p:extLst>
       <p:ext uri="{BB962C8B-B14F-4D97-AF65-F5344CB8AC3E}">
@@ -40503,6 +41017,44 @@
           </a:p>
         </p:txBody>
       </p:sp>
+      <p:cxnSp>
+        <p:nvCxnSpPr>
+          <p:cNvPr id="4" name="Straight Connector 3">
+            <a:extLst>
+              <a:ext uri="{FF2B5EF4-FFF2-40B4-BE49-F238E27FC236}">
+                <a16:creationId xmlns:a16="http://schemas.microsoft.com/office/drawing/2014/main" id="{2085DFCA-7D7D-3657-1B6D-1AD72E9F2DD5}"/>
+              </a:ext>
+            </a:extLst>
+          </p:cNvPr>
+          <p:cNvCxnSpPr>
+            <a:cxnSpLocks/>
+          </p:cNvCxnSpPr>
+          <p:nvPr/>
+        </p:nvCxnSpPr>
+        <p:spPr>
+          <a:xfrm>
+            <a:off x="5740924" y="1825625"/>
+            <a:ext cx="0" cy="4351338"/>
+          </a:xfrm>
+          <a:prstGeom prst="line">
+            <a:avLst/>
+          </a:prstGeom>
+        </p:spPr>
+        <p:style>
+          <a:lnRef idx="3">
+            <a:schemeClr val="dk1"/>
+          </a:lnRef>
+          <a:fillRef idx="0">
+            <a:schemeClr val="dk1"/>
+          </a:fillRef>
+          <a:effectRef idx="2">
+            <a:schemeClr val="dk1"/>
+          </a:effectRef>
+          <a:fontRef idx="minor">
+            <a:schemeClr val="tx1"/>
+          </a:fontRef>
+        </p:style>
+      </p:cxnSp>
     </p:spTree>
     <p:extLst>
       <p:ext uri="{BB962C8B-B14F-4D97-AF65-F5344CB8AC3E}">
@@ -43274,7 +43826,7 @@
             </a:pPr>
             <a:r>
               <a:rPr lang="nl-NL" sz="1800" dirty="0"/>
-              <a:t>Kolommen / attributen voorzien van namen.</a:t>
+              <a:t>Kolommen / kenmerken voorzien van namen.</a:t>
             </a:r>
           </a:p>
           <a:p>
@@ -48593,7 +49145,18 @@
             </a:pPr>
             <a:r>
               <a:rPr lang="nl-NL" sz="2000" dirty="0"/>
-              <a:t>Met EXPLAIN QUERY PLAN kun je zien hoe </a:t>
+              <a:t>Met </a:t>
+            </a:r>
+            <a:r>
+              <a:rPr lang="nl-NL" sz="2000" dirty="0">
+                <a:latin typeface="Courier New" panose="02070309020205020404" pitchFamily="49" charset="0"/>
+                <a:cs typeface="Courier New" panose="02070309020205020404" pitchFamily="49" charset="0"/>
+              </a:rPr>
+              <a:t>EXPLAIN QUERY PLAN</a:t>
+            </a:r>
+            <a:r>
+              <a:rPr lang="nl-NL" sz="2000" dirty="0"/>
+              <a:t> kun je zien hoe </a:t>
             </a:r>
             <a:r>
               <a:rPr lang="nl-NL" sz="2000" dirty="0" err="1"/>
@@ -48618,7 +49181,18 @@
             </a:pPr>
             <a:r>
               <a:rPr lang="nl-NL" sz="2000" dirty="0"/>
-              <a:t>Als je SCAN TABLE in de output ziet, dan wordt een hele tabel doorzocht; dit is traag…</a:t>
+              <a:t>Als je </a:t>
+            </a:r>
+            <a:r>
+              <a:rPr lang="nl-NL" sz="2000" dirty="0">
+                <a:latin typeface="Courier New" panose="02070309020205020404" pitchFamily="49" charset="0"/>
+                <a:cs typeface="Courier New" panose="02070309020205020404" pitchFamily="49" charset="0"/>
+              </a:rPr>
+              <a:t>SCAN TABLE</a:t>
+            </a:r>
+            <a:r>
+              <a:rPr lang="nl-NL" sz="2000" dirty="0"/>
+              <a:t> in de output ziet, dan wordt een hele tabel doorzocht; dit is traag…</a:t>
             </a:r>
           </a:p>
           <a:p>
@@ -48635,15 +49209,18 @@
             </a:pPr>
             <a:r>
               <a:rPr lang="nl-NL" sz="2000" dirty="0"/>
-              <a:t>Als je SEARCH TABLE … USING INDEX ziet, dan wordt een index gebruikt; dit is </a:t>
-            </a:r>
-            <a:r>
-              <a:rPr lang="nl-NL" sz="2000" dirty="0" err="1"/>
-              <a:t>efficient</a:t>
+              <a:t>Als je </a:t>
+            </a:r>
+            <a:r>
+              <a:rPr lang="nl-NL" sz="2000" dirty="0">
+                <a:latin typeface="Courier New" panose="02070309020205020404" pitchFamily="49" charset="0"/>
+                <a:cs typeface="Courier New" panose="02070309020205020404" pitchFamily="49" charset="0"/>
+              </a:rPr>
+              <a:t>SEARCH TABLE … USING INDEX</a:t>
             </a:r>
             <a:r>
               <a:rPr lang="nl-NL" sz="2000" dirty="0"/>
-              <a:t>!</a:t>
+              <a:t> ziet wordt een index gebruikt; dit is efficiënt!</a:t>
             </a:r>
           </a:p>
         </p:txBody>
@@ -49070,7 +49647,7 @@
           <p:nvPr>
             <p:extLst>
               <p:ext uri="{D42A27DB-BD31-4B8C-83A1-F6EECF244321}">
-                <p14:modId xmlns:p14="http://schemas.microsoft.com/office/powerpoint/2010/main" val="2131834242"/>
+                <p14:modId xmlns:p14="http://schemas.microsoft.com/office/powerpoint/2010/main" val="2304650336"/>
               </p:ext>
             </p:extLst>
           </p:nvPr>
@@ -49143,7 +49720,7 @@
                     <a:p>
                       <a:r>
                         <a:rPr lang="nl-NL" noProof="0" dirty="0" err="1"/>
-                        <a:t>ArtikelID</a:t>
+                        <a:t>ProductID</a:t>
                       </a:r>
                       <a:endParaRPr lang="nl-NL" noProof="0" dirty="0"/>
                     </a:p>
@@ -49215,7 +49792,7 @@
           <p:nvPr>
             <p:extLst>
               <p:ext uri="{D42A27DB-BD31-4B8C-83A1-F6EECF244321}">
-                <p14:modId xmlns:p14="http://schemas.microsoft.com/office/powerpoint/2010/main" val="2047191692"/>
+                <p14:modId xmlns:p14="http://schemas.microsoft.com/office/powerpoint/2010/main" val="1453095550"/>
               </p:ext>
             </p:extLst>
           </p:nvPr>
@@ -49247,7 +49824,7 @@
                     <a:p>
                       <a:r>
                         <a:rPr lang="nl-NL" noProof="0" dirty="0"/>
-                        <a:t>Artikelen</a:t>
+                        <a:t>Producten</a:t>
                       </a:r>
                     </a:p>
                   </a:txBody>
@@ -49267,7 +49844,7 @@
                     <a:p>
                       <a:r>
                         <a:rPr lang="nl-NL" noProof="0" dirty="0" err="1"/>
-                        <a:t>ArtikelID</a:t>
+                        <a:t>ProductID</a:t>
                       </a:r>
                       <a:endParaRPr lang="nl-NL" noProof="0" dirty="0"/>
                     </a:p>
@@ -49288,7 +49865,7 @@
                     <a:p>
                       <a:r>
                         <a:rPr lang="nl-NL" noProof="0" dirty="0"/>
-                        <a:t>PLU</a:t>
+                        <a:t>Naam</a:t>
                       </a:r>
                     </a:p>
                   </a:txBody>

</xml_diff>

<commit_message>
SQL Powerpoint typo squatting
</commit_message>
<xml_diff>
--- a/sql/sql_introductie.pptx
+++ b/sql/sql_introductie.pptx
@@ -277,7 +277,7 @@
           <a:p>
             <a:fld id="{61CE90D0-176A-4BE5-B54F-392F0A16E3B3}" type="datetimeFigureOut">
               <a:rPr lang="en-NL" smtClean="0"/>
-              <a:t>31/10/2022</a:t>
+              <a:t>02/11/2022</a:t>
             </a:fld>
             <a:endParaRPr lang="en-NL"/>
           </a:p>
@@ -2777,34 +2777,6 @@
           <a:bodyPr/>
           <a:lstStyle/>
           <a:p>
-            <a:r>
-              <a:rPr lang="en-US" dirty="0"/>
-              <a:t>VRAAG: Hoe </a:t>
-            </a:r>
-            <a:r>
-              <a:rPr lang="en-US" dirty="0" err="1"/>
-              <a:t>draai</a:t>
-            </a:r>
-            <a:r>
-              <a:rPr lang="en-US" dirty="0"/>
-              <a:t> je de </a:t>
-            </a:r>
-            <a:r>
-              <a:rPr lang="en-US" dirty="0" err="1"/>
-              <a:t>selectie</a:t>
-            </a:r>
-            <a:r>
-              <a:rPr lang="en-US" dirty="0"/>
-              <a:t> </a:t>
-            </a:r>
-            <a:r>
-              <a:rPr lang="en-US" dirty="0" err="1"/>
-              <a:t>precies</a:t>
-            </a:r>
-            <a:r>
-              <a:rPr lang="en-US" dirty="0"/>
-              <a:t> om?</a:t>
-            </a:r>
             <a:endParaRPr lang="en-NL" dirty="0"/>
           </a:p>
         </p:txBody>
@@ -3414,7 +3386,7 @@
           <a:p>
             <a:fld id="{7B15CBDA-B49C-4B0F-9869-5B15867EA611}" type="datetimeFigureOut">
               <a:rPr lang="en-NL" smtClean="0"/>
-              <a:t>31/10/2022</a:t>
+              <a:t>02/11/2022</a:t>
             </a:fld>
             <a:endParaRPr lang="en-NL"/>
           </a:p>
@@ -3614,7 +3586,7 @@
           <a:p>
             <a:fld id="{7B15CBDA-B49C-4B0F-9869-5B15867EA611}" type="datetimeFigureOut">
               <a:rPr lang="en-NL" smtClean="0"/>
-              <a:t>31/10/2022</a:t>
+              <a:t>02/11/2022</a:t>
             </a:fld>
             <a:endParaRPr lang="en-NL"/>
           </a:p>
@@ -3824,7 +3796,7 @@
           <a:p>
             <a:fld id="{7B15CBDA-B49C-4B0F-9869-5B15867EA611}" type="datetimeFigureOut">
               <a:rPr lang="en-NL" smtClean="0"/>
-              <a:t>31/10/2022</a:t>
+              <a:t>02/11/2022</a:t>
             </a:fld>
             <a:endParaRPr lang="en-NL"/>
           </a:p>
@@ -4024,7 +3996,7 @@
           <a:p>
             <a:fld id="{7B15CBDA-B49C-4B0F-9869-5B15867EA611}" type="datetimeFigureOut">
               <a:rPr lang="en-NL" smtClean="0"/>
-              <a:t>31/10/2022</a:t>
+              <a:t>02/11/2022</a:t>
             </a:fld>
             <a:endParaRPr lang="en-NL"/>
           </a:p>
@@ -4300,7 +4272,7 @@
           <a:p>
             <a:fld id="{7B15CBDA-B49C-4B0F-9869-5B15867EA611}" type="datetimeFigureOut">
               <a:rPr lang="en-NL" smtClean="0"/>
-              <a:t>31/10/2022</a:t>
+              <a:t>02/11/2022</a:t>
             </a:fld>
             <a:endParaRPr lang="en-NL"/>
           </a:p>
@@ -4568,7 +4540,7 @@
           <a:p>
             <a:fld id="{7B15CBDA-B49C-4B0F-9869-5B15867EA611}" type="datetimeFigureOut">
               <a:rPr lang="en-NL" smtClean="0"/>
-              <a:t>31/10/2022</a:t>
+              <a:t>02/11/2022</a:t>
             </a:fld>
             <a:endParaRPr lang="en-NL"/>
           </a:p>
@@ -4983,7 +4955,7 @@
           <a:p>
             <a:fld id="{7B15CBDA-B49C-4B0F-9869-5B15867EA611}" type="datetimeFigureOut">
               <a:rPr lang="en-NL" smtClean="0"/>
-              <a:t>31/10/2022</a:t>
+              <a:t>02/11/2022</a:t>
             </a:fld>
             <a:endParaRPr lang="en-NL"/>
           </a:p>
@@ -5125,7 +5097,7 @@
           <a:p>
             <a:fld id="{7B15CBDA-B49C-4B0F-9869-5B15867EA611}" type="datetimeFigureOut">
               <a:rPr lang="en-NL" smtClean="0"/>
-              <a:t>31/10/2022</a:t>
+              <a:t>02/11/2022</a:t>
             </a:fld>
             <a:endParaRPr lang="en-NL"/>
           </a:p>
@@ -5238,7 +5210,7 @@
           <a:p>
             <a:fld id="{7B15CBDA-B49C-4B0F-9869-5B15867EA611}" type="datetimeFigureOut">
               <a:rPr lang="en-NL" smtClean="0"/>
-              <a:t>31/10/2022</a:t>
+              <a:t>02/11/2022</a:t>
             </a:fld>
             <a:endParaRPr lang="en-NL"/>
           </a:p>
@@ -5551,7 +5523,7 @@
           <a:p>
             <a:fld id="{7B15CBDA-B49C-4B0F-9869-5B15867EA611}" type="datetimeFigureOut">
               <a:rPr lang="en-NL" smtClean="0"/>
-              <a:t>31/10/2022</a:t>
+              <a:t>02/11/2022</a:t>
             </a:fld>
             <a:endParaRPr lang="en-NL"/>
           </a:p>
@@ -5840,7 +5812,7 @@
           <a:p>
             <a:fld id="{7B15CBDA-B49C-4B0F-9869-5B15867EA611}" type="datetimeFigureOut">
               <a:rPr lang="en-NL" smtClean="0"/>
-              <a:t>31/10/2022</a:t>
+              <a:t>02/11/2022</a:t>
             </a:fld>
             <a:endParaRPr lang="en-NL"/>
           </a:p>
@@ -6083,7 +6055,7 @@
           <a:p>
             <a:fld id="{7B15CBDA-B49C-4B0F-9869-5B15867EA611}" type="datetimeFigureOut">
               <a:rPr lang="en-NL" smtClean="0"/>
-              <a:t>31/10/2022</a:t>
+              <a:t>02/11/2022</a:t>
             </a:fld>
             <a:endParaRPr lang="en-NL"/>
           </a:p>
@@ -9580,20 +9552,6 @@
               </a:rPr>
               <a:t>BedragBTW</a:t>
             </a:r>
-            <a:r>
-              <a:rPr lang="nl-NL" sz="2000" dirty="0">
-                <a:latin typeface="Courier New" panose="02070309020205020404" pitchFamily="49" charset="0"/>
-                <a:cs typeface="Courier New" panose="02070309020205020404" pitchFamily="49" charset="0"/>
-              </a:rPr>
-              <a:t> AS </a:t>
-            </a:r>
-            <a:r>
-              <a:rPr lang="nl-NL" sz="2000" dirty="0" err="1">
-                <a:latin typeface="Courier New" panose="02070309020205020404" pitchFamily="49" charset="0"/>
-                <a:cs typeface="Courier New" panose="02070309020205020404" pitchFamily="49" charset="0"/>
-              </a:rPr>
-              <a:t>PrijsInc</a:t>
-            </a:r>
             <a:endParaRPr lang="nl-NL" sz="2000" dirty="0">
               <a:latin typeface="Courier New" panose="02070309020205020404" pitchFamily="49" charset="0"/>
               <a:cs typeface="Courier New" panose="02070309020205020404" pitchFamily="49" charset="0"/>
@@ -9902,7 +9860,7 @@
           <a:p>
             <a:r>
               <a:rPr lang="nl-NL" sz="2000" dirty="0"/>
-              <a:t>Optelsom van kolommen met alias.</a:t>
+              <a:t>Optelsom van kolommen.</a:t>
             </a:r>
           </a:p>
           <a:p>
@@ -13119,7 +13077,7 @@
             </a:pPr>
             <a:r>
               <a:rPr lang="nl-NL" sz="2000" dirty="0"/>
-              <a:t>Bereken voor elke transactie het totaal bedrag exclusief BTW.</a:t>
+              <a:t>Bereken het totaal bedrag exclusief BTW per transactie.</a:t>
             </a:r>
           </a:p>
           <a:p>
@@ -13577,7 +13535,7 @@
               <a:buNone/>
             </a:pPr>
             <a:r>
-              <a:rPr lang="nl-NL" sz="2000" dirty="0">
+              <a:rPr lang="nl-NL" sz="2000" b="1" dirty="0">
                 <a:latin typeface="Courier New" panose="02070309020205020404" pitchFamily="49" charset="0"/>
                 <a:cs typeface="Courier New" panose="02070309020205020404" pitchFamily="49" charset="0"/>
               </a:rPr>
@@ -13589,7 +13547,7 @@
               <a:buNone/>
             </a:pPr>
             <a:r>
-              <a:rPr lang="nl-NL" sz="2000" dirty="0">
+              <a:rPr lang="nl-NL" sz="2000" b="1" dirty="0">
                 <a:latin typeface="Courier New" panose="02070309020205020404" pitchFamily="49" charset="0"/>
                 <a:cs typeface="Courier New" panose="02070309020205020404" pitchFamily="49" charset="0"/>
               </a:rPr>
@@ -13601,7 +13559,7 @@
               <a:buNone/>
             </a:pPr>
             <a:r>
-              <a:rPr lang="nl-NL" sz="2000" dirty="0">
+              <a:rPr lang="nl-NL" sz="2000" b="1" dirty="0">
                 <a:latin typeface="Courier New" panose="02070309020205020404" pitchFamily="49" charset="0"/>
                 <a:cs typeface="Courier New" panose="02070309020205020404" pitchFamily="49" charset="0"/>
               </a:rPr>
@@ -15922,14 +15880,21 @@
                 <a:latin typeface="Courier New" panose="02070309020205020404" pitchFamily="49" charset="0"/>
                 <a:cs typeface="Courier New" panose="02070309020205020404" pitchFamily="49" charset="0"/>
               </a:rPr>
-              <a:t>    ORDER BY </a:t>
-            </a:r>
-            <a:r>
-              <a:rPr lang="en-US" sz="2000" dirty="0" err="1">
-                <a:latin typeface="Courier New" panose="02070309020205020404" pitchFamily="49" charset="0"/>
-                <a:cs typeface="Courier New" panose="02070309020205020404" pitchFamily="49" charset="0"/>
-              </a:rPr>
-              <a:t>TransactieDatum</a:t>
+              <a:t>    </a:t>
+            </a:r>
+            <a:r>
+              <a:rPr lang="en-US" sz="2000" b="1" dirty="0">
+                <a:latin typeface="Courier New" panose="02070309020205020404" pitchFamily="49" charset="0"/>
+                <a:cs typeface="Courier New" panose="02070309020205020404" pitchFamily="49" charset="0"/>
+              </a:rPr>
+              <a:t>PARTITION BY </a:t>
+            </a:r>
+            <a:r>
+              <a:rPr lang="en-US" sz="2000" b="1" dirty="0" err="1">
+                <a:latin typeface="Courier New" panose="02070309020205020404" pitchFamily="49" charset="0"/>
+                <a:cs typeface="Courier New" panose="02070309020205020404" pitchFamily="49" charset="0"/>
+              </a:rPr>
+              <a:t>ProductType</a:t>
             </a:r>
             <a:endParaRPr lang="en-US" sz="2000" dirty="0">
               <a:latin typeface="Courier New" panose="02070309020205020404" pitchFamily="49" charset="0"/>
@@ -15945,21 +15910,14 @@
                 <a:latin typeface="Courier New" panose="02070309020205020404" pitchFamily="49" charset="0"/>
                 <a:cs typeface="Courier New" panose="02070309020205020404" pitchFamily="49" charset="0"/>
               </a:rPr>
-              <a:t>    </a:t>
-            </a:r>
-            <a:r>
-              <a:rPr lang="en-US" sz="2000" b="1" dirty="0">
-                <a:latin typeface="Courier New" panose="02070309020205020404" pitchFamily="49" charset="0"/>
-                <a:cs typeface="Courier New" panose="02070309020205020404" pitchFamily="49" charset="0"/>
-              </a:rPr>
-              <a:t>PARTITION BY </a:t>
-            </a:r>
-            <a:r>
-              <a:rPr lang="en-US" sz="2000" b="1" dirty="0" err="1">
-                <a:latin typeface="Courier New" panose="02070309020205020404" pitchFamily="49" charset="0"/>
-                <a:cs typeface="Courier New" panose="02070309020205020404" pitchFamily="49" charset="0"/>
-              </a:rPr>
-              <a:t>ProductType</a:t>
+              <a:t>    ORDER BY </a:t>
+            </a:r>
+            <a:r>
+              <a:rPr lang="en-US" sz="2000" dirty="0" err="1">
+                <a:latin typeface="Courier New" panose="02070309020205020404" pitchFamily="49" charset="0"/>
+                <a:cs typeface="Courier New" panose="02070309020205020404" pitchFamily="49" charset="0"/>
+              </a:rPr>
+              <a:t>TransactieDatum</a:t>
             </a:r>
             <a:endParaRPr lang="en-US" sz="2000" b="1" dirty="0">
               <a:latin typeface="Courier New" panose="02070309020205020404" pitchFamily="49" charset="0"/>
@@ -16034,7 +15992,7 @@
         <p:spPr>
           <a:xfrm>
             <a:off x="838200" y="5272118"/>
-            <a:ext cx="10515600" cy="608364"/>
+            <a:ext cx="10515600" cy="1062694"/>
           </a:xfrm>
           <a:prstGeom prst="rect">
             <a:avLst/>
@@ -16042,7 +16000,7 @@
         </p:spPr>
         <p:txBody>
           <a:bodyPr vert="horz" lIns="91440" tIns="45720" rIns="91440" bIns="45720" rtlCol="0">
-            <a:normAutofit/>
+            <a:normAutofit lnSpcReduction="10000"/>
           </a:bodyPr>
           <a:lstStyle>
             <a:lvl1pPr marL="228600" indent="-228600" algn="l" defTabSz="914400" rtl="0" eaLnBrk="1" latinLnBrk="0" hangingPunct="1">
@@ -16230,6 +16188,37 @@
             <a:r>
               <a:rPr lang="nl-NL" sz="2000" dirty="0"/>
               <a:t> bereken je groepsgewijze totalen.</a:t>
+            </a:r>
+          </a:p>
+          <a:p>
+            <a:pPr>
+              <a:lnSpc>
+                <a:spcPct val="150000"/>
+              </a:lnSpc>
+              <a:buFontTx/>
+              <a:buChar char="-"/>
+            </a:pPr>
+            <a:r>
+              <a:rPr lang="nl-NL" sz="2000" dirty="0"/>
+              <a:t>Let op: </a:t>
+            </a:r>
+            <a:r>
+              <a:rPr lang="nl-NL" sz="2000" dirty="0">
+                <a:latin typeface="Courier New" panose="02070309020205020404" pitchFamily="49" charset="0"/>
+                <a:cs typeface="Courier New" panose="02070309020205020404" pitchFamily="49" charset="0"/>
+              </a:rPr>
+              <a:t>PARTITION BY</a:t>
+            </a:r>
+            <a:r>
+              <a:rPr lang="nl-NL" sz="2000" dirty="0"/>
+              <a:t> komt eerst; dus </a:t>
+            </a:r>
+            <a:r>
+              <a:rPr lang="nl-NL" sz="2000" dirty="0">
+                <a:latin typeface="Courier New" panose="02070309020205020404" pitchFamily="49" charset="0"/>
+                <a:cs typeface="Courier New" panose="02070309020205020404" pitchFamily="49" charset="0"/>
+              </a:rPr>
+              <a:t>PARTITION BY … ORDER BY …</a:t>
             </a:r>
           </a:p>
         </p:txBody>
@@ -27781,7 +27770,7 @@
         <p:spPr/>
         <p:txBody>
           <a:bodyPr>
-            <a:noAutofit/>
+            <a:normAutofit fontScale="92500" lnSpcReduction="10000"/>
           </a:bodyPr>
           <a:lstStyle/>
           <a:p>
@@ -27792,6 +27781,28 @@
               <a:rPr lang="nl-NL" sz="2000" dirty="0"/>
               <a:t>Voer de volgende koppelingen uit op basis van het ID veld en bekijk de uitkomsten:</a:t>
             </a:r>
+          </a:p>
+          <a:p>
+            <a:pPr marL="0" indent="0">
+              <a:buNone/>
+            </a:pPr>
+            <a:r>
+              <a:rPr lang="nl-NL" sz="2000" dirty="0"/>
+              <a:t>Tabellen: </a:t>
+            </a:r>
+            <a:r>
+              <a:rPr lang="nl-NL" sz="2000" dirty="0" err="1"/>
+              <a:t>KoppelA</a:t>
+            </a:r>
+            <a:r>
+              <a:rPr lang="nl-NL" sz="2000" dirty="0"/>
+              <a:t> en </a:t>
+            </a:r>
+            <a:r>
+              <a:rPr lang="nl-NL" sz="2000" dirty="0" err="1"/>
+              <a:t>KoppelB</a:t>
+            </a:r>
+            <a:endParaRPr lang="nl-NL" sz="2000" dirty="0"/>
           </a:p>
           <a:p>
             <a:pPr marL="457200" indent="-457200">
@@ -37442,7 +37453,7 @@
                 <a:latin typeface="Courier New" panose="02070309020205020404" pitchFamily="49" charset="0"/>
                 <a:cs typeface="Courier New" panose="02070309020205020404" pitchFamily="49" charset="0"/>
               </a:rPr>
-              <a:t>        "name": "</a:t>
+              <a:t>        "naam": "</a:t>
             </a:r>
             <a:r>
               <a:rPr lang="en-US" sz="1400" dirty="0" err="1">
@@ -37465,14 +37476,14 @@
                 <a:latin typeface="Courier New" panose="02070309020205020404" pitchFamily="49" charset="0"/>
                 <a:cs typeface="Courier New" panose="02070309020205020404" pitchFamily="49" charset="0"/>
               </a:rPr>
-              <a:t>        "</a:t>
+              <a:t>        “</a:t>
             </a:r>
             <a:r>
               <a:rPr lang="en-US" sz="1400" dirty="0" err="1">
                 <a:latin typeface="Courier New" panose="02070309020205020404" pitchFamily="49" charset="0"/>
                 <a:cs typeface="Courier New" panose="02070309020205020404" pitchFamily="49" charset="0"/>
               </a:rPr>
-              <a:t>last_name</a:t>
+              <a:t>achternaam</a:t>
             </a:r>
             <a:r>
               <a:rPr lang="en-US" sz="1400" dirty="0">
@@ -38157,7 +38168,7 @@
                 <a:latin typeface="Courier New" panose="02070309020205020404" pitchFamily="49" charset="0"/>
                 <a:cs typeface="Courier New" panose="02070309020205020404" pitchFamily="49" charset="0"/>
               </a:rPr>
-              <a:t>        "name": "</a:t>
+              <a:t>        “naam": "</a:t>
             </a:r>
             <a:r>
               <a:rPr lang="en-US" sz="1400" dirty="0" err="1">
@@ -38180,14 +38191,14 @@
                 <a:latin typeface="Courier New" panose="02070309020205020404" pitchFamily="49" charset="0"/>
                 <a:cs typeface="Courier New" panose="02070309020205020404" pitchFamily="49" charset="0"/>
               </a:rPr>
-              <a:t>        "</a:t>
+              <a:t>        “</a:t>
             </a:r>
             <a:r>
               <a:rPr lang="en-US" sz="1400" dirty="0" err="1">
                 <a:latin typeface="Courier New" panose="02070309020205020404" pitchFamily="49" charset="0"/>
                 <a:cs typeface="Courier New" panose="02070309020205020404" pitchFamily="49" charset="0"/>
               </a:rPr>
-              <a:t>last_name</a:t>
+              <a:t>achternaam</a:t>
             </a:r>
             <a:r>
               <a:rPr lang="en-US" sz="1400" dirty="0">
@@ -41539,35 +41550,33 @@
       </p:sp>
       <p:cxnSp>
         <p:nvCxnSpPr>
-          <p:cNvPr id="4" name="Straight Connector 3">
+          <p:cNvPr id="6" name="Straight Connector 5">
             <a:extLst>
               <a:ext uri="{FF2B5EF4-FFF2-40B4-BE49-F238E27FC236}">
-                <a16:creationId xmlns:a16="http://schemas.microsoft.com/office/drawing/2014/main" id="{26D08CE9-5AB3-6C4E-473D-276E49BECAF9}"/>
+                <a16:creationId xmlns:a16="http://schemas.microsoft.com/office/drawing/2014/main" id="{0269538C-D7B2-E5E9-CEB1-10C0947C6332}"/>
               </a:ext>
             </a:extLst>
           </p:cNvPr>
-          <p:cNvCxnSpPr>
-            <a:cxnSpLocks/>
-          </p:cNvCxnSpPr>
+          <p:cNvCxnSpPr/>
           <p:nvPr/>
         </p:nvCxnSpPr>
         <p:spPr>
           <a:xfrm>
-            <a:off x="6363094" y="1555423"/>
-            <a:ext cx="0" cy="4621540"/>
+            <a:off x="6254736" y="1825625"/>
+            <a:ext cx="0" cy="4351338"/>
           </a:xfrm>
           <a:prstGeom prst="line">
             <a:avLst/>
           </a:prstGeom>
         </p:spPr>
         <p:style>
-          <a:lnRef idx="1">
+          <a:lnRef idx="3">
             <a:schemeClr val="dk1"/>
           </a:lnRef>
           <a:fillRef idx="0">
             <a:schemeClr val="dk1"/>
           </a:fillRef>
-          <a:effectRef idx="0">
+          <a:effectRef idx="2">
             <a:schemeClr val="dk1"/>
           </a:effectRef>
           <a:fontRef idx="minor">
@@ -42284,35 +42293,33 @@
       </p:sp>
       <p:cxnSp>
         <p:nvCxnSpPr>
-          <p:cNvPr id="8" name="Straight Connector 7">
+          <p:cNvPr id="4" name="Straight Connector 3">
             <a:extLst>
               <a:ext uri="{FF2B5EF4-FFF2-40B4-BE49-F238E27FC236}">
-                <a16:creationId xmlns:a16="http://schemas.microsoft.com/office/drawing/2014/main" id="{77185DA1-91D0-15CB-2091-62AD6B617B68}"/>
+                <a16:creationId xmlns:a16="http://schemas.microsoft.com/office/drawing/2014/main" id="{0E7C30C7-776C-5670-7240-7680901A692A}"/>
               </a:ext>
             </a:extLst>
           </p:cNvPr>
-          <p:cNvCxnSpPr>
-            <a:cxnSpLocks/>
-          </p:cNvCxnSpPr>
+          <p:cNvCxnSpPr/>
           <p:nvPr/>
         </p:nvCxnSpPr>
         <p:spPr>
           <a:xfrm>
-            <a:off x="6794609" y="1555423"/>
-            <a:ext cx="0" cy="4621540"/>
+            <a:off x="6792065" y="1825625"/>
+            <a:ext cx="0" cy="4351338"/>
           </a:xfrm>
           <a:prstGeom prst="line">
             <a:avLst/>
           </a:prstGeom>
         </p:spPr>
         <p:style>
-          <a:lnRef idx="1">
+          <a:lnRef idx="3">
             <a:schemeClr val="dk1"/>
           </a:lnRef>
           <a:fillRef idx="0">
             <a:schemeClr val="dk1"/>
           </a:fillRef>
-          <a:effectRef idx="0">
+          <a:effectRef idx="2">
             <a:schemeClr val="dk1"/>
           </a:effectRef>
           <a:fontRef idx="minor">
@@ -42649,7 +42656,18 @@
             </a:pPr>
             <a:r>
               <a:rPr lang="nl-NL" sz="2000" dirty="0"/>
-              <a:t>Tabellen verwijderen is heel eenvoudig met DROP TABLE.</a:t>
+              <a:t>Tabellen verwijderen is heel eenvoudig met </a:t>
+            </a:r>
+            <a:r>
+              <a:rPr lang="nl-NL" sz="2000" dirty="0">
+                <a:latin typeface="Courier New" panose="02070309020205020404" pitchFamily="49" charset="0"/>
+                <a:cs typeface="Courier New" panose="02070309020205020404" pitchFamily="49" charset="0"/>
+              </a:rPr>
+              <a:t>DROP TABLE</a:t>
+            </a:r>
+            <a:r>
+              <a:rPr lang="nl-NL" sz="2000" dirty="0"/>
+              <a:t>.</a:t>
             </a:r>
           </a:p>
           <a:p>
@@ -42683,42 +42701,51 @@
             </a:pPr>
             <a:r>
               <a:rPr lang="nl-NL" sz="2000" dirty="0"/>
-              <a:t>Als je IF EXISTS toevoegt omzeil je dit probleem.</a:t>
+              <a:t>Als je </a:t>
+            </a:r>
+            <a:r>
+              <a:rPr lang="nl-NL" sz="2000" dirty="0">
+                <a:latin typeface="Courier New" panose="02070309020205020404" pitchFamily="49" charset="0"/>
+                <a:cs typeface="Courier New" panose="02070309020205020404" pitchFamily="49" charset="0"/>
+              </a:rPr>
+              <a:t>IF EXISTS</a:t>
+            </a:r>
+            <a:r>
+              <a:rPr lang="nl-NL" sz="2000" dirty="0"/>
+              <a:t> toevoegt omzeil je deze foutmelding.</a:t>
             </a:r>
           </a:p>
         </p:txBody>
       </p:sp>
       <p:cxnSp>
         <p:nvCxnSpPr>
-          <p:cNvPr id="6" name="Straight Connector 5">
+          <p:cNvPr id="4" name="Straight Connector 3">
             <a:extLst>
               <a:ext uri="{FF2B5EF4-FFF2-40B4-BE49-F238E27FC236}">
-                <a16:creationId xmlns:a16="http://schemas.microsoft.com/office/drawing/2014/main" id="{7B4CE884-2598-D7CF-1383-4CCEE3D2B252}"/>
+                <a16:creationId xmlns:a16="http://schemas.microsoft.com/office/drawing/2014/main" id="{3EF16A4D-E52A-231F-821F-F106ABC949FD}"/>
               </a:ext>
             </a:extLst>
           </p:cNvPr>
-          <p:cNvCxnSpPr>
-            <a:cxnSpLocks/>
-          </p:cNvCxnSpPr>
+          <p:cNvCxnSpPr/>
           <p:nvPr/>
         </p:nvCxnSpPr>
         <p:spPr>
           <a:xfrm>
-            <a:off x="6794609" y="1555423"/>
-            <a:ext cx="0" cy="4621540"/>
+            <a:off x="6792065" y="1825625"/>
+            <a:ext cx="0" cy="4351338"/>
           </a:xfrm>
           <a:prstGeom prst="line">
             <a:avLst/>
           </a:prstGeom>
         </p:spPr>
         <p:style>
-          <a:lnRef idx="1">
+          <a:lnRef idx="3">
             <a:schemeClr val="dk1"/>
           </a:lnRef>
           <a:fillRef idx="0">
             <a:schemeClr val="dk1"/>
           </a:fillRef>
-          <a:effectRef idx="0">
+          <a:effectRef idx="2">
             <a:schemeClr val="dk1"/>
           </a:effectRef>
           <a:fontRef idx="minor">
@@ -42781,7 +42808,7 @@
           <a:p>
             <a:r>
               <a:rPr lang="nl-NL" sz="3600" dirty="0"/>
-              <a:t>Beperkingen op tabellen</a:t>
+              <a:t>Controles op tabellen</a:t>
             </a:r>
           </a:p>
         </p:txBody>
@@ -42879,16 +42906,23 @@
                 <a:latin typeface="Courier New" panose="02070309020205020404" pitchFamily="49" charset="0"/>
                 <a:cs typeface="Courier New" panose="02070309020205020404" pitchFamily="49" charset="0"/>
               </a:rPr>
-              <a:t>  CONSTRAINT </a:t>
-            </a:r>
-            <a:r>
-              <a:rPr lang="nl-NL" sz="2000" dirty="0" err="1">
+              <a:t>  </a:t>
+            </a:r>
+            <a:r>
+              <a:rPr lang="nl-NL" sz="2000" b="1" dirty="0">
+                <a:latin typeface="Courier New" panose="02070309020205020404" pitchFamily="49" charset="0"/>
+                <a:cs typeface="Courier New" panose="02070309020205020404" pitchFamily="49" charset="0"/>
+              </a:rPr>
+              <a:t>CONSTRAINT </a:t>
+            </a:r>
+            <a:r>
+              <a:rPr lang="nl-NL" sz="2000" b="1" dirty="0" err="1">
                 <a:latin typeface="Courier New" panose="02070309020205020404" pitchFamily="49" charset="0"/>
                 <a:cs typeface="Courier New" panose="02070309020205020404" pitchFamily="49" charset="0"/>
               </a:rPr>
               <a:t>CHK_Leeftijd</a:t>
             </a:r>
-            <a:endParaRPr lang="nl-NL" sz="2000" dirty="0">
+            <a:endParaRPr lang="nl-NL" sz="2000" b="1" dirty="0">
               <a:latin typeface="Courier New" panose="02070309020205020404" pitchFamily="49" charset="0"/>
               <a:cs typeface="Courier New" panose="02070309020205020404" pitchFamily="49" charset="0"/>
             </a:endParaRPr>
@@ -42898,7 +42932,7 @@
               <a:buNone/>
             </a:pPr>
             <a:r>
-              <a:rPr lang="nl-NL" sz="2000" dirty="0">
+              <a:rPr lang="nl-NL" sz="2000" b="1" dirty="0">
                 <a:latin typeface="Courier New" panose="02070309020205020404" pitchFamily="49" charset="0"/>
                 <a:cs typeface="Courier New" panose="02070309020205020404" pitchFamily="49" charset="0"/>
               </a:rPr>
@@ -43117,7 +43151,18 @@
             </a:pPr>
             <a:r>
               <a:rPr lang="nl-NL" sz="2000" dirty="0"/>
-              <a:t>Met CONSTRAINT kun je ook beperkingen opleggen op een tabel.</a:t>
+              <a:t>Met </a:t>
+            </a:r>
+            <a:r>
+              <a:rPr lang="nl-NL" sz="2000" dirty="0">
+                <a:latin typeface="Courier New" panose="02070309020205020404" pitchFamily="49" charset="0"/>
+                <a:cs typeface="Courier New" panose="02070309020205020404" pitchFamily="49" charset="0"/>
+              </a:rPr>
+              <a:t>CONSTRAINT</a:t>
+            </a:r>
+            <a:r>
+              <a:rPr lang="nl-NL" sz="2000" dirty="0"/>
+              <a:t> kun je een controle instellen op een tabel.</a:t>
             </a:r>
           </a:p>
           <a:p>
@@ -43134,7 +43179,18 @@
             </a:pPr>
             <a:r>
               <a:rPr lang="nl-NL" sz="2000" dirty="0"/>
-              <a:t>Achter CONSTRAINT geef je de naam op van de beperking / regel.</a:t>
+              <a:t>Achter </a:t>
+            </a:r>
+            <a:r>
+              <a:rPr lang="nl-NL" sz="2000" dirty="0">
+                <a:latin typeface="Courier New" panose="02070309020205020404" pitchFamily="49" charset="0"/>
+                <a:cs typeface="Courier New" panose="02070309020205020404" pitchFamily="49" charset="0"/>
+              </a:rPr>
+              <a:t>CONSTRAINT</a:t>
+            </a:r>
+            <a:r>
+              <a:rPr lang="nl-NL" sz="2000" dirty="0"/>
+              <a:t> geef je de naam op van de controle.</a:t>
             </a:r>
           </a:p>
           <a:p>
@@ -43151,7 +43207,18 @@
             </a:pPr>
             <a:r>
               <a:rPr lang="nl-NL" sz="2000" dirty="0"/>
-              <a:t>In dit geval is de beperking een controle op het bereik van Leeftijd.</a:t>
+              <a:t>De controle in dit voorbeeld is op het bereik van </a:t>
+            </a:r>
+            <a:r>
+              <a:rPr lang="nl-NL" sz="2000" dirty="0">
+                <a:latin typeface="Courier New" panose="02070309020205020404" pitchFamily="49" charset="0"/>
+                <a:cs typeface="Courier New" panose="02070309020205020404" pitchFamily="49" charset="0"/>
+              </a:rPr>
+              <a:t>Leeftijd</a:t>
+            </a:r>
+            <a:r>
+              <a:rPr lang="nl-NL" sz="2000" dirty="0"/>
+              <a:t>.</a:t>
             </a:r>
           </a:p>
           <a:p>
@@ -43364,16 +43431,23 @@
                 <a:latin typeface="Courier New" panose="02070309020205020404" pitchFamily="49" charset="0"/>
                 <a:cs typeface="Courier New" panose="02070309020205020404" pitchFamily="49" charset="0"/>
               </a:rPr>
-              <a:t>  CONSTRAINT </a:t>
-            </a:r>
-            <a:r>
-              <a:rPr lang="nl-NL" sz="2000" dirty="0" err="1">
+              <a:t>  </a:t>
+            </a:r>
+            <a:r>
+              <a:rPr lang="nl-NL" sz="2000" b="1" dirty="0">
+                <a:latin typeface="Courier New" panose="02070309020205020404" pitchFamily="49" charset="0"/>
+                <a:cs typeface="Courier New" panose="02070309020205020404" pitchFamily="49" charset="0"/>
+              </a:rPr>
+              <a:t>CONSTRAINT </a:t>
+            </a:r>
+            <a:r>
+              <a:rPr lang="nl-NL" sz="2000" b="1" dirty="0" err="1">
                 <a:latin typeface="Courier New" panose="02070309020205020404" pitchFamily="49" charset="0"/>
                 <a:cs typeface="Courier New" panose="02070309020205020404" pitchFamily="49" charset="0"/>
               </a:rPr>
               <a:t>PK_NaamAchternaam</a:t>
             </a:r>
-            <a:endParaRPr lang="nl-NL" sz="2000" dirty="0">
+            <a:endParaRPr lang="nl-NL" sz="2000" b="1" dirty="0">
               <a:latin typeface="Courier New" panose="02070309020205020404" pitchFamily="49" charset="0"/>
               <a:cs typeface="Courier New" panose="02070309020205020404" pitchFamily="49" charset="0"/>
             </a:endParaRPr>
@@ -43383,7 +43457,7 @@
               <a:buNone/>
             </a:pPr>
             <a:r>
-              <a:rPr lang="nl-NL" sz="2000" dirty="0">
+              <a:rPr lang="nl-NL" sz="2000" b="1" dirty="0">
                 <a:latin typeface="Courier New" panose="02070309020205020404" pitchFamily="49" charset="0"/>
                 <a:cs typeface="Courier New" panose="02070309020205020404" pitchFamily="49" charset="0"/>
               </a:rPr>
@@ -43602,7 +43676,7 @@
             </a:pPr>
             <a:r>
               <a:rPr lang="nl-NL" sz="2000" dirty="0"/>
-              <a:t>Kolom of combinatie van kolommen die de unieke rijen identificeert.</a:t>
+              <a:t>Kolom of combinatie van kolommen die rijen identificeert.</a:t>
             </a:r>
           </a:p>
           <a:p>
@@ -43636,7 +43710,7 @@
             </a:pPr>
             <a:r>
               <a:rPr lang="nl-NL" sz="2000" dirty="0"/>
-              <a:t>Kies zo klein mogelijk aantal kolommen om de sleutel te vormen:</a:t>
+              <a:t>Kies een zo klein mogelijk aantal kolommen om de sleutel te vormen:</a:t>
             </a:r>
           </a:p>
           <a:p>
@@ -43670,35 +43744,33 @@
       </p:sp>
       <p:cxnSp>
         <p:nvCxnSpPr>
-          <p:cNvPr id="6" name="Straight Connector 5">
+          <p:cNvPr id="4" name="Straight Connector 3">
             <a:extLst>
               <a:ext uri="{FF2B5EF4-FFF2-40B4-BE49-F238E27FC236}">
-                <a16:creationId xmlns:a16="http://schemas.microsoft.com/office/drawing/2014/main" id="{16CD8699-DAD3-F64A-F76B-A36FF8E57A79}"/>
+                <a16:creationId xmlns:a16="http://schemas.microsoft.com/office/drawing/2014/main" id="{829AA1CC-DF24-6816-AB3C-036242589958}"/>
               </a:ext>
             </a:extLst>
           </p:cNvPr>
-          <p:cNvCxnSpPr>
-            <a:cxnSpLocks/>
-          </p:cNvCxnSpPr>
+          <p:cNvCxnSpPr/>
           <p:nvPr/>
         </p:nvCxnSpPr>
         <p:spPr>
           <a:xfrm>
-            <a:off x="6794609" y="1555423"/>
-            <a:ext cx="0" cy="4621540"/>
+            <a:off x="6792065" y="1825625"/>
+            <a:ext cx="0" cy="4351338"/>
           </a:xfrm>
           <a:prstGeom prst="line">
             <a:avLst/>
           </a:prstGeom>
         </p:spPr>
         <p:style>
-          <a:lnRef idx="1">
+          <a:lnRef idx="3">
             <a:schemeClr val="dk1"/>
           </a:lnRef>
           <a:fillRef idx="0">
             <a:schemeClr val="dk1"/>
           </a:fillRef>
-          <a:effectRef idx="0">
+          <a:effectRef idx="2">
             <a:schemeClr val="dk1"/>
           </a:effectRef>
           <a:fontRef idx="minor">
@@ -44671,16 +44743,23 @@
                 <a:latin typeface="Courier New" panose="02070309020205020404" pitchFamily="49" charset="0"/>
                 <a:cs typeface="Courier New" panose="02070309020205020404" pitchFamily="49" charset="0"/>
               </a:rPr>
-              <a:t>  CONSTRAINT </a:t>
-            </a:r>
-            <a:r>
-              <a:rPr lang="nl-NL" sz="2000" dirty="0" err="1">
+              <a:t>  </a:t>
+            </a:r>
+            <a:r>
+              <a:rPr lang="nl-NL" sz="2000" b="1" dirty="0">
+                <a:latin typeface="Courier New" panose="02070309020205020404" pitchFamily="49" charset="0"/>
+                <a:cs typeface="Courier New" panose="02070309020205020404" pitchFamily="49" charset="0"/>
+              </a:rPr>
+              <a:t>CONSTRAINT </a:t>
+            </a:r>
+            <a:r>
+              <a:rPr lang="nl-NL" sz="2000" b="1" dirty="0" err="1">
                 <a:latin typeface="Courier New" panose="02070309020205020404" pitchFamily="49" charset="0"/>
                 <a:cs typeface="Courier New" panose="02070309020205020404" pitchFamily="49" charset="0"/>
               </a:rPr>
               <a:t>FK_PersoonId</a:t>
             </a:r>
-            <a:endParaRPr lang="nl-NL" sz="2000" dirty="0">
+            <a:endParaRPr lang="nl-NL" sz="2000" b="1" dirty="0">
               <a:latin typeface="Courier New" panose="02070309020205020404" pitchFamily="49" charset="0"/>
               <a:cs typeface="Courier New" panose="02070309020205020404" pitchFamily="49" charset="0"/>
             </a:endParaRPr>
@@ -44690,21 +44769,21 @@
               <a:buNone/>
             </a:pPr>
             <a:r>
-              <a:rPr lang="nl-NL" sz="2000" dirty="0">
+              <a:rPr lang="nl-NL" sz="2000" b="1" dirty="0">
                 <a:latin typeface="Courier New" panose="02070309020205020404" pitchFamily="49" charset="0"/>
                 <a:cs typeface="Courier New" panose="02070309020205020404" pitchFamily="49" charset="0"/>
               </a:rPr>
               <a:t>    FOREIGN KEY(</a:t>
             </a:r>
             <a:r>
-              <a:rPr lang="nl-NL" sz="2000" dirty="0" err="1">
+              <a:rPr lang="nl-NL" sz="2000" b="1" dirty="0" err="1">
                 <a:latin typeface="Courier New" panose="02070309020205020404" pitchFamily="49" charset="0"/>
                 <a:cs typeface="Courier New" panose="02070309020205020404" pitchFamily="49" charset="0"/>
               </a:rPr>
               <a:t>PersoonId</a:t>
             </a:r>
             <a:r>
-              <a:rPr lang="nl-NL" sz="2000" dirty="0">
+              <a:rPr lang="nl-NL" sz="2000" b="1" dirty="0">
                 <a:latin typeface="Courier New" panose="02070309020205020404" pitchFamily="49" charset="0"/>
                 <a:cs typeface="Courier New" panose="02070309020205020404" pitchFamily="49" charset="0"/>
               </a:rPr>
@@ -44716,21 +44795,21 @@
               <a:buNone/>
             </a:pPr>
             <a:r>
-              <a:rPr lang="nl-NL" sz="2000" dirty="0">
+              <a:rPr lang="nl-NL" sz="2000" b="1" dirty="0">
                 <a:latin typeface="Courier New" panose="02070309020205020404" pitchFamily="49" charset="0"/>
                 <a:cs typeface="Courier New" panose="02070309020205020404" pitchFamily="49" charset="0"/>
               </a:rPr>
               <a:t>    REFERENCES Personen(</a:t>
             </a:r>
             <a:r>
-              <a:rPr lang="nl-NL" sz="2000" dirty="0" err="1">
+              <a:rPr lang="nl-NL" sz="2000" b="1" dirty="0" err="1">
                 <a:latin typeface="Courier New" panose="02070309020205020404" pitchFamily="49" charset="0"/>
                 <a:cs typeface="Courier New" panose="02070309020205020404" pitchFamily="49" charset="0"/>
               </a:rPr>
               <a:t>Id</a:t>
             </a:r>
             <a:r>
-              <a:rPr lang="nl-NL" sz="2000" dirty="0">
+              <a:rPr lang="nl-NL" sz="2000" b="1" dirty="0">
                 <a:latin typeface="Courier New" panose="02070309020205020404" pitchFamily="49" charset="0"/>
                 <a:cs typeface="Courier New" panose="02070309020205020404" pitchFamily="49" charset="0"/>
               </a:rPr>
@@ -44767,8 +44846,8 @@
         </p:nvSpPr>
         <p:spPr>
           <a:xfrm>
-            <a:off x="6300247" y="1797346"/>
-            <a:ext cx="4813955" cy="4351338"/>
+            <a:off x="6579909" y="1797346"/>
+            <a:ext cx="4534293" cy="4351338"/>
           </a:xfrm>
           <a:prstGeom prst="rect">
             <a:avLst/>
@@ -45029,35 +45108,33 @@
       </p:sp>
       <p:cxnSp>
         <p:nvCxnSpPr>
-          <p:cNvPr id="7" name="Straight Connector 6">
+          <p:cNvPr id="6" name="Straight Connector 5">
             <a:extLst>
               <a:ext uri="{FF2B5EF4-FFF2-40B4-BE49-F238E27FC236}">
-                <a16:creationId xmlns:a16="http://schemas.microsoft.com/office/drawing/2014/main" id="{B170D8D5-2440-4CE8-5B0A-48465EFC6D96}"/>
+                <a16:creationId xmlns:a16="http://schemas.microsoft.com/office/drawing/2014/main" id="{E58CB898-19F3-FEFA-C4AE-B3AA33D5D243}"/>
               </a:ext>
             </a:extLst>
           </p:cNvPr>
-          <p:cNvCxnSpPr>
-            <a:cxnSpLocks/>
-          </p:cNvCxnSpPr>
+          <p:cNvCxnSpPr/>
           <p:nvPr/>
         </p:nvCxnSpPr>
         <p:spPr>
           <a:xfrm>
-            <a:off x="5891754" y="1555423"/>
-            <a:ext cx="0" cy="4621540"/>
+            <a:off x="6199695" y="1825625"/>
+            <a:ext cx="0" cy="4351338"/>
           </a:xfrm>
           <a:prstGeom prst="line">
             <a:avLst/>
           </a:prstGeom>
         </p:spPr>
         <p:style>
-          <a:lnRef idx="1">
+          <a:lnRef idx="3">
             <a:schemeClr val="dk1"/>
           </a:lnRef>
           <a:fillRef idx="0">
             <a:schemeClr val="dk1"/>
           </a:fillRef>
-          <a:effectRef idx="0">
+          <a:effectRef idx="2">
             <a:schemeClr val="dk1"/>
           </a:effectRef>
           <a:fontRef idx="minor">
@@ -45309,7 +45386,14 @@
                 <a:latin typeface="Courier New" panose="02070309020205020404" pitchFamily="49" charset="0"/>
                 <a:cs typeface="Courier New" panose="02070309020205020404" pitchFamily="49" charset="0"/>
               </a:rPr>
-              <a:t>    ON DELETE CASCADE</a:t>
+              <a:t>    </a:t>
+            </a:r>
+            <a:r>
+              <a:rPr lang="nl-NL" sz="2000" b="1" dirty="0">
+                <a:latin typeface="Courier New" panose="02070309020205020404" pitchFamily="49" charset="0"/>
+                <a:cs typeface="Courier New" panose="02070309020205020404" pitchFamily="49" charset="0"/>
+              </a:rPr>
+              <a:t>ON DELETE CASCADE</a:t>
             </a:r>
           </a:p>
           <a:p>
@@ -45317,7 +45401,7 @@
               <a:buNone/>
             </a:pPr>
             <a:r>
-              <a:rPr lang="nl-NL" sz="2000" dirty="0">
+              <a:rPr lang="nl-NL" sz="2000" b="1" dirty="0">
                 <a:latin typeface="Courier New" panose="02070309020205020404" pitchFamily="49" charset="0"/>
                 <a:cs typeface="Courier New" panose="02070309020205020404" pitchFamily="49" charset="0"/>
               </a:rPr>
@@ -45354,8 +45438,8 @@
         </p:nvSpPr>
         <p:spPr>
           <a:xfrm>
-            <a:off x="6303390" y="1825625"/>
-            <a:ext cx="5257800" cy="4351338"/>
+            <a:off x="6636470" y="1825625"/>
+            <a:ext cx="4924719" cy="4351338"/>
           </a:xfrm>
           <a:prstGeom prst="rect">
             <a:avLst/>
@@ -45666,35 +45750,33 @@
       </p:sp>
       <p:cxnSp>
         <p:nvCxnSpPr>
-          <p:cNvPr id="4" name="Straight Connector 3">
+          <p:cNvPr id="6" name="Straight Connector 5">
             <a:extLst>
               <a:ext uri="{FF2B5EF4-FFF2-40B4-BE49-F238E27FC236}">
-                <a16:creationId xmlns:a16="http://schemas.microsoft.com/office/drawing/2014/main" id="{7B3B7336-AE12-6776-ECEB-9A11F7B37D1B}"/>
+                <a16:creationId xmlns:a16="http://schemas.microsoft.com/office/drawing/2014/main" id="{0D01F7C8-8420-060C-46A9-EE1193CC7D1E}"/>
               </a:ext>
             </a:extLst>
           </p:cNvPr>
-          <p:cNvCxnSpPr>
-            <a:cxnSpLocks/>
-          </p:cNvCxnSpPr>
+          <p:cNvCxnSpPr/>
           <p:nvPr/>
         </p:nvCxnSpPr>
         <p:spPr>
           <a:xfrm>
-            <a:off x="5891754" y="1555423"/>
-            <a:ext cx="0" cy="4621540"/>
+            <a:off x="6199695" y="1825625"/>
+            <a:ext cx="0" cy="4351338"/>
           </a:xfrm>
           <a:prstGeom prst="line">
             <a:avLst/>
           </a:prstGeom>
         </p:spPr>
         <p:style>
-          <a:lnRef idx="1">
+          <a:lnRef idx="3">
             <a:schemeClr val="dk1"/>
           </a:lnRef>
           <a:fillRef idx="0">
             <a:schemeClr val="dk1"/>
           </a:fillRef>
-          <a:effectRef idx="0">
+          <a:effectRef idx="2">
             <a:schemeClr val="dk1"/>
           </a:effectRef>
           <a:fontRef idx="minor">
@@ -46079,7 +46161,7 @@
             </a:pPr>
             <a:r>
               <a:rPr lang="nl-NL" sz="2000" dirty="0"/>
-              <a:t>Voeg een aantal personen en boeken in</a:t>
+              <a:t>Voer een aantal personen en boeken in</a:t>
             </a:r>
           </a:p>
           <a:p>
@@ -46113,7 +46195,15 @@
             </a:pPr>
             <a:r>
               <a:rPr lang="nl-NL" sz="2000" dirty="0"/>
-              <a:t>Wat gebeurt er als je en boek verwijderd?</a:t>
+              <a:t>Wat gebeurt er als </a:t>
+            </a:r>
+            <a:r>
+              <a:rPr lang="nl-NL" sz="2000"/>
+              <a:t>je een </a:t>
+            </a:r>
+            <a:r>
+              <a:rPr lang="nl-NL" sz="2000" dirty="0"/>
+              <a:t>boek verwijderd?</a:t>
             </a:r>
           </a:p>
         </p:txBody>
@@ -46461,7 +46551,7 @@
             </a:pPr>
             <a:r>
               <a:rPr lang="nl-NL" sz="2000" dirty="0"/>
-              <a:t>Een INDEX kan een query flink versnellen.</a:t>
+              <a:t>Een index kan een query flink versnellen.</a:t>
             </a:r>
           </a:p>
           <a:p>
@@ -46529,7 +46619,7 @@
             </a:pPr>
             <a:r>
               <a:rPr lang="nl-NL" sz="2000" dirty="0"/>
-              <a:t>Indices kunnen kolommen combineren, bijvoorbeeld (Naam, Achternaam).</a:t>
+              <a:t>Indices kunnen kolommen combineren, bijvoorbeeld Naam en Achternaam.</a:t>
             </a:r>
           </a:p>
         </p:txBody>
@@ -48560,8 +48650,8 @@
         </p:nvSpPr>
         <p:spPr>
           <a:xfrm>
-            <a:off x="7222732" y="1825625"/>
-            <a:ext cx="4131067" cy="4351338"/>
+            <a:off x="7343481" y="1825625"/>
+            <a:ext cx="4010318" cy="4351338"/>
           </a:xfrm>
           <a:prstGeom prst="rect">
             <a:avLst/>
@@ -48742,7 +48832,18 @@
             </a:pPr>
             <a:r>
               <a:rPr lang="nl-NL" sz="2000" dirty="0"/>
-              <a:t>Met CREATE INDEX maak je index aan op 1 of meerdere kolommen.</a:t>
+              <a:t>Met </a:t>
+            </a:r>
+            <a:r>
+              <a:rPr lang="nl-NL" sz="2000" dirty="0">
+                <a:latin typeface="Courier New" panose="02070309020205020404" pitchFamily="49" charset="0"/>
+                <a:cs typeface="Courier New" panose="02070309020205020404" pitchFamily="49" charset="0"/>
+              </a:rPr>
+              <a:t>CREATE INDEX </a:t>
+            </a:r>
+            <a:r>
+              <a:rPr lang="nl-NL" sz="2000" dirty="0"/>
+              <a:t>maak je index aan op 1 of meerdere kolommen.</a:t>
             </a:r>
           </a:p>
           <a:p>
@@ -48781,6 +48882,42 @@
           </a:p>
         </p:txBody>
       </p:sp>
+      <p:cxnSp>
+        <p:nvCxnSpPr>
+          <p:cNvPr id="7" name="Straight Connector 6">
+            <a:extLst>
+              <a:ext uri="{FF2B5EF4-FFF2-40B4-BE49-F238E27FC236}">
+                <a16:creationId xmlns:a16="http://schemas.microsoft.com/office/drawing/2014/main" id="{25F74A41-A3CA-79AD-4811-55CE0734864F}"/>
+              </a:ext>
+            </a:extLst>
+          </p:cNvPr>
+          <p:cNvCxnSpPr/>
+          <p:nvPr/>
+        </p:nvCxnSpPr>
+        <p:spPr>
+          <a:xfrm>
+            <a:off x="6986781" y="1825625"/>
+            <a:ext cx="0" cy="4351338"/>
+          </a:xfrm>
+          <a:prstGeom prst="line">
+            <a:avLst/>
+          </a:prstGeom>
+        </p:spPr>
+        <p:style>
+          <a:lnRef idx="3">
+            <a:schemeClr val="dk1"/>
+          </a:lnRef>
+          <a:fillRef idx="0">
+            <a:schemeClr val="dk1"/>
+          </a:fillRef>
+          <a:effectRef idx="2">
+            <a:schemeClr val="dk1"/>
+          </a:effectRef>
+          <a:fontRef idx="minor">
+            <a:schemeClr val="tx1"/>
+          </a:fontRef>
+        </p:style>
+      </p:cxnSp>
     </p:spTree>
     <p:extLst>
       <p:ext uri="{BB962C8B-B14F-4D97-AF65-F5344CB8AC3E}">
@@ -48963,8 +49100,8 @@
         </p:nvSpPr>
         <p:spPr>
           <a:xfrm>
-            <a:off x="7222732" y="1825625"/>
-            <a:ext cx="4131067" cy="4351338"/>
+            <a:off x="7362334" y="1825625"/>
+            <a:ext cx="3991465" cy="4351338"/>
           </a:xfrm>
           <a:prstGeom prst="rect">
             <a:avLst/>
@@ -49225,6 +49362,42 @@
           </a:p>
         </p:txBody>
       </p:sp>
+      <p:cxnSp>
+        <p:nvCxnSpPr>
+          <p:cNvPr id="4" name="Straight Connector 3">
+            <a:extLst>
+              <a:ext uri="{FF2B5EF4-FFF2-40B4-BE49-F238E27FC236}">
+                <a16:creationId xmlns:a16="http://schemas.microsoft.com/office/drawing/2014/main" id="{1B3FF13B-2B29-5C31-922A-C1F555453D2B}"/>
+              </a:ext>
+            </a:extLst>
+          </p:cNvPr>
+          <p:cNvCxnSpPr/>
+          <p:nvPr/>
+        </p:nvCxnSpPr>
+        <p:spPr>
+          <a:xfrm>
+            <a:off x="6986781" y="1825625"/>
+            <a:ext cx="0" cy="4351338"/>
+          </a:xfrm>
+          <a:prstGeom prst="line">
+            <a:avLst/>
+          </a:prstGeom>
+        </p:spPr>
+        <p:style>
+          <a:lnRef idx="3">
+            <a:schemeClr val="dk1"/>
+          </a:lnRef>
+          <a:fillRef idx="0">
+            <a:schemeClr val="dk1"/>
+          </a:fillRef>
+          <a:effectRef idx="2">
+            <a:schemeClr val="dk1"/>
+          </a:effectRef>
+          <a:fontRef idx="minor">
+            <a:schemeClr val="tx1"/>
+          </a:fontRef>
+        </p:style>
+      </p:cxnSp>
     </p:spTree>
     <p:extLst>
       <p:ext uri="{BB962C8B-B14F-4D97-AF65-F5344CB8AC3E}">
@@ -50458,7 +50631,7 @@
             </a:pPr>
             <a:r>
               <a:rPr lang="nl-NL" sz="2000" dirty="0"/>
-              <a:t>Gebruik hiërarchische categorisatie systeem: onderdelen =&gt; harde schijven =&gt; intern SSD.</a:t>
+              <a:t>Hoe ga je om met prijswijzigingen en kortingsacties?</a:t>
             </a:r>
           </a:p>
           <a:p>
@@ -50475,7 +50648,15 @@
             </a:pPr>
             <a:r>
               <a:rPr lang="nl-NL" sz="2000" dirty="0"/>
-              <a:t>Hoe ga je om met prijswijzigingen en kortingsacties?</a:t>
+              <a:t>Hoe houd je voorraden / leveringen / </a:t>
+            </a:r>
+            <a:r>
+              <a:rPr lang="nl-NL" sz="2000" dirty="0" err="1"/>
+              <a:t>retouren</a:t>
+            </a:r>
+            <a:r>
+              <a:rPr lang="nl-NL" sz="2000" dirty="0"/>
+              <a:t> bij?</a:t>
             </a:r>
           </a:p>
           <a:p>
@@ -50492,15 +50673,7 @@
             </a:pPr>
             <a:r>
               <a:rPr lang="nl-NL" sz="2000" dirty="0"/>
-              <a:t>Hoe houd je voorraden / leveringen / </a:t>
-            </a:r>
-            <a:r>
-              <a:rPr lang="nl-NL" sz="2000" dirty="0" err="1"/>
-              <a:t>retouren</a:t>
-            </a:r>
-            <a:r>
-              <a:rPr lang="nl-NL" sz="2000" dirty="0"/>
-              <a:t> bij?</a:t>
+              <a:t>Hoe ga je om met producten met allerlei verschillende eigenschappen?</a:t>
             </a:r>
           </a:p>
           <a:p>
@@ -50517,7 +50690,7 @@
             </a:pPr>
             <a:r>
               <a:rPr lang="nl-NL" sz="2000" dirty="0"/>
-              <a:t>Hoe ga je om met producten met allerlei verschillende eigenschappen?</a:t>
+              <a:t>Houd rekening met verschillende adressen per klant; factuur / levering.</a:t>
             </a:r>
           </a:p>
           <a:p>
@@ -50534,7 +50707,7 @@
             </a:pPr>
             <a:r>
               <a:rPr lang="nl-NL" sz="2000" dirty="0"/>
-              <a:t>Houd rekening met verschillende adressen per klant; factuur / levering.</a:t>
+              <a:t>Heb je product categorieën? Zijn deze exclusief? Zijn ze hiërarchisch?</a:t>
             </a:r>
           </a:p>
           <a:p>

</xml_diff>